<commit_message>
new game loop slides. Announcements
</commit_message>
<xml_diff>
--- a/slides/GameArchitecture.pptx
+++ b/slides/GameArchitecture.pptx
@@ -5,10 +5,10 @@
     <p:sldMasterId id="2147483648" r:id="rId1"/>
   </p:sldMasterIdLst>
   <p:notesMasterIdLst>
-    <p:notesMasterId r:id="rId21"/>
+    <p:notesMasterId r:id="rId35"/>
   </p:notesMasterIdLst>
   <p:handoutMasterIdLst>
-    <p:handoutMasterId r:id="rId22"/>
+    <p:handoutMasterId r:id="rId36"/>
   </p:handoutMasterIdLst>
   <p:sldIdLst>
     <p:sldId id="283" r:id="rId2"/>
@@ -18,18 +18,32 @@
     <p:sldId id="287" r:id="rId6"/>
     <p:sldId id="295" r:id="rId7"/>
     <p:sldId id="288" r:id="rId8"/>
-    <p:sldId id="289" r:id="rId9"/>
-    <p:sldId id="290" r:id="rId10"/>
-    <p:sldId id="291" r:id="rId11"/>
-    <p:sldId id="292" r:id="rId12"/>
-    <p:sldId id="293" r:id="rId13"/>
-    <p:sldId id="294" r:id="rId14"/>
-    <p:sldId id="325" r:id="rId15"/>
-    <p:sldId id="326" r:id="rId16"/>
-    <p:sldId id="327" r:id="rId17"/>
-    <p:sldId id="328" r:id="rId18"/>
-    <p:sldId id="329" r:id="rId19"/>
-    <p:sldId id="330" r:id="rId20"/>
+    <p:sldId id="334" r:id="rId9"/>
+    <p:sldId id="289" r:id="rId10"/>
+    <p:sldId id="290" r:id="rId11"/>
+    <p:sldId id="291" r:id="rId12"/>
+    <p:sldId id="292" r:id="rId13"/>
+    <p:sldId id="293" r:id="rId14"/>
+    <p:sldId id="331" r:id="rId15"/>
+    <p:sldId id="333" r:id="rId16"/>
+    <p:sldId id="335" r:id="rId17"/>
+    <p:sldId id="336" r:id="rId18"/>
+    <p:sldId id="337" r:id="rId19"/>
+    <p:sldId id="338" r:id="rId20"/>
+    <p:sldId id="339" r:id="rId21"/>
+    <p:sldId id="340" r:id="rId22"/>
+    <p:sldId id="341" r:id="rId23"/>
+    <p:sldId id="342" r:id="rId24"/>
+    <p:sldId id="343" r:id="rId25"/>
+    <p:sldId id="344" r:id="rId26"/>
+    <p:sldId id="345" r:id="rId27"/>
+    <p:sldId id="294" r:id="rId28"/>
+    <p:sldId id="325" r:id="rId29"/>
+    <p:sldId id="326" r:id="rId30"/>
+    <p:sldId id="327" r:id="rId31"/>
+    <p:sldId id="328" r:id="rId32"/>
+    <p:sldId id="329" r:id="rId33"/>
+    <p:sldId id="330" r:id="rId34"/>
   </p:sldIdLst>
   <p:sldSz cx="9144000" cy="6858000" type="screen4x3"/>
   <p:notesSz cx="7099300" cy="9385300"/>
@@ -4102,68 +4116,40 @@
           <a:p>
             <a:r>
               <a:rPr lang="en-US" sz="2800" dirty="0"/>
-              <a:t>Problem of sensing is hard!</a:t>
+              <a:t>An NPC (Non-Player Character) is anything that has volition in the world that isn’t you</a:t>
+            </a:r>
+          </a:p>
+          <a:p>
+            <a:r>
+              <a:rPr lang="en-US" sz="2800" dirty="0"/>
+              <a:t>NPCs take input from the AI engine (maybe!) but not from a direct controller</a:t>
+            </a:r>
+          </a:p>
+          <a:p>
+            <a:r>
+              <a:rPr lang="en-US" sz="2800" dirty="0"/>
+              <a:t>Work on the idea of Sense-Think-Act:</a:t>
             </a:r>
           </a:p>
           <a:p>
             <a:pPr lvl="1"/>
             <a:r>
-              <a:rPr lang="en-US" sz="2400" dirty="0"/>
-              <a:t>What does the NPC need to know?</a:t>
+              <a:rPr lang="en-US" dirty="0"/>
+              <a:t>Sense the state of the world around it (how can we “cheat” here to make an NPC “harder”?)</a:t>
             </a:r>
           </a:p>
           <a:p>
             <a:pPr lvl="1"/>
             <a:r>
-              <a:rPr lang="en-US" sz="2400" dirty="0"/>
-              <a:t>What is the state of ALL OTHER OBJECTS?  UGH.</a:t>
-            </a:r>
-          </a:p>
-          <a:p>
-            <a:r>
-              <a:rPr lang="en-US" sz="2800" dirty="0"/>
-              <a:t>Limit sensing?  “Cheat?”</a:t>
-            </a:r>
-          </a:p>
-          <a:p>
-            <a:r>
-              <a:rPr lang="en-US" sz="2800" dirty="0"/>
-              <a:t>Another problem – thinking is hard!</a:t>
+              <a:rPr lang="en-US" dirty="0"/>
+              <a:t>Think about what action to perform (usually limited choices)</a:t>
             </a:r>
           </a:p>
           <a:p>
             <a:pPr lvl="1"/>
             <a:r>
-              <a:rPr lang="en-US" sz="2400" dirty="0"/>
-              <a:t>Can take more than one frame to decide what to do!</a:t>
-            </a:r>
-          </a:p>
-          <a:p>
-            <a:pPr lvl="1"/>
-            <a:r>
-              <a:rPr lang="en-US" sz="2400" dirty="0"/>
-              <a:t>Act without thinking?</a:t>
-            </a:r>
-          </a:p>
-          <a:p>
-            <a:pPr lvl="1"/>
-            <a:r>
-              <a:rPr lang="en-US" sz="2400" dirty="0"/>
-              <a:t>What if one acts, then the next acts on that action?</a:t>
-            </a:r>
-          </a:p>
-          <a:p>
-            <a:r>
               <a:rPr lang="en-US" dirty="0"/>
-              <a:t>More in AI and </a:t>
-            </a:r>
-            <a:r>
-              <a:rPr lang="en-US" dirty="0" err="1"/>
-              <a:t>Pathfinding</a:t>
-            </a:r>
-            <a:r>
-              <a:rPr lang="en-US" dirty="0"/>
-              <a:t>!</a:t>
+              <a:t>Act in the world</a:t>
             </a:r>
           </a:p>
         </p:txBody>
@@ -4195,7 +4181,7 @@
     </p:spTree>
     <p:extLst>
       <p:ext uri="{BB962C8B-B14F-4D97-AF65-F5344CB8AC3E}">
-        <p14:creationId xmlns:p14="http://schemas.microsoft.com/office/powerpoint/2010/main" val="3866522155"/>
+        <p14:creationId xmlns:p14="http://schemas.microsoft.com/office/powerpoint/2010/main" val="4013398994"/>
       </p:ext>
     </p:extLst>
   </p:cSld>
@@ -4239,7 +4225,7 @@
           <a:p>
             <a:r>
               <a:rPr lang="en-US" dirty="0"/>
-              <a:t>Step 4. World Processing</a:t>
+              <a:t>Step 3. Process NPCs</a:t>
             </a:r>
           </a:p>
         </p:txBody>
@@ -4260,40 +4246,70 @@
           <a:lstStyle/>
           <a:p>
             <a:r>
+              <a:rPr lang="en-US" sz="2800" dirty="0"/>
+              <a:t>Problem of sensing is hard!</a:t>
+            </a:r>
+          </a:p>
+          <a:p>
+            <a:pPr lvl="1"/>
+            <a:r>
+              <a:rPr lang="en-US" sz="2400" dirty="0"/>
+              <a:t>What does the NPC need to know?</a:t>
+            </a:r>
+          </a:p>
+          <a:p>
+            <a:pPr lvl="1"/>
+            <a:r>
+              <a:rPr lang="en-US" sz="2400" dirty="0"/>
+              <a:t>What is the state of ALL OTHER OBJECTS?  UGH.</a:t>
+            </a:r>
+          </a:p>
+          <a:p>
+            <a:r>
+              <a:rPr lang="en-US" sz="2800" dirty="0"/>
+              <a:t>Limit sensing?  “Cheat?”</a:t>
+            </a:r>
+          </a:p>
+          <a:p>
+            <a:r>
+              <a:rPr lang="en-US" sz="2800" dirty="0"/>
+              <a:t>Another problem – thinking is hard!</a:t>
+            </a:r>
+          </a:p>
+          <a:p>
+            <a:pPr lvl="1"/>
+            <a:r>
+              <a:rPr lang="en-US" sz="2400" dirty="0"/>
+              <a:t>Can take more than one frame to decide what to do!</a:t>
+            </a:r>
+          </a:p>
+          <a:p>
+            <a:pPr lvl="1"/>
+            <a:r>
+              <a:rPr lang="en-US" sz="2400" dirty="0"/>
+              <a:t>Act without thinking?</a:t>
+            </a:r>
+          </a:p>
+          <a:p>
+            <a:pPr lvl="1"/>
+            <a:r>
+              <a:rPr lang="en-US" sz="2400" dirty="0"/>
+              <a:t>What if one acts, then the next acts on that action?</a:t>
+            </a:r>
+          </a:p>
+          <a:p>
+            <a:r>
               <a:rPr lang="en-US" dirty="0"/>
-              <a:t>Physics!</a:t>
-            </a:r>
-          </a:p>
-          <a:p>
+              <a:t>More in AI and </a:t>
+            </a:r>
+            <a:r>
+              <a:rPr lang="en-US" dirty="0" err="1"/>
+              <a:t>Pathfinding</a:t>
+            </a:r>
             <a:r>
               <a:rPr lang="en-US" dirty="0"/>
-              <a:t>Lighting!</a:t>
-            </a:r>
-          </a:p>
-          <a:p>
-            <a:r>
-              <a:rPr lang="en-US" dirty="0"/>
-              <a:t>Collisions!</a:t>
-            </a:r>
-          </a:p>
-          <a:p>
-            <a:r>
-              <a:rPr lang="en-US" dirty="0"/>
-              <a:t>So much cool stuff!</a:t>
-            </a:r>
-          </a:p>
-          <a:p>
-            <a:r>
-              <a:rPr lang="en-US" dirty="0"/>
-              <a:t>But later! </a:t>
-            </a:r>
-            <a:r>
-              <a:rPr lang="en-US" dirty="0">
-                <a:sym typeface="Wingdings"/>
-              </a:rPr>
-              <a:t></a:t>
-            </a:r>
-            <a:endParaRPr lang="en-US" dirty="0"/>
+              <a:t>!</a:t>
+            </a:r>
           </a:p>
         </p:txBody>
       </p:sp>
@@ -4324,7 +4340,7 @@
     </p:spTree>
     <p:extLst>
       <p:ext uri="{BB962C8B-B14F-4D97-AF65-F5344CB8AC3E}">
-        <p14:creationId xmlns:p14="http://schemas.microsoft.com/office/powerpoint/2010/main" val="360778685"/>
+        <p14:creationId xmlns:p14="http://schemas.microsoft.com/office/powerpoint/2010/main" val="3866522155"/>
       </p:ext>
     </p:extLst>
   </p:cSld>
@@ -4368,7 +4384,7 @@
           <a:p>
             <a:r>
               <a:rPr lang="en-US" dirty="0"/>
-              <a:t>Drawing</a:t>
+              <a:t>Step 4. World Processing</a:t>
             </a:r>
           </a:p>
         </p:txBody>
@@ -4390,40 +4406,39 @@
           <a:p>
             <a:r>
               <a:rPr lang="en-US" dirty="0"/>
-              <a:t>Well, it needs to be fast!</a:t>
-            </a:r>
-          </a:p>
-          <a:p>
-            <a:pPr lvl="1"/>
+              <a:t>Physics!</a:t>
+            </a:r>
+          </a:p>
+          <a:p>
             <a:r>
               <a:rPr lang="en-US" dirty="0"/>
-              <a:t>We want to do as little computation as possible</a:t>
-            </a:r>
-          </a:p>
-          <a:p>
-            <a:pPr lvl="1"/>
+              <a:t>Lighting!</a:t>
+            </a:r>
+          </a:p>
+          <a:p>
             <a:r>
               <a:rPr lang="en-US" dirty="0"/>
-              <a:t>Draw ONLY what’s on the screen!</a:t>
-            </a:r>
-          </a:p>
-          <a:p>
+              <a:t>Collisions!</a:t>
+            </a:r>
+          </a:p>
+          <a:p>
+            <a:r>
+              <a:rPr lang="en-US" dirty="0"/>
+              <a:t>So much cool stuff!</a:t>
+            </a:r>
+          </a:p>
+          <a:p>
+            <a:r>
+              <a:rPr lang="en-US" dirty="0"/>
+              <a:t>But later! </a:t>
+            </a:r>
+            <a:r>
+              <a:rPr lang="en-US" dirty="0">
+                <a:sym typeface="Wingdings"/>
+              </a:rPr>
+              <a:t></a:t>
+            </a:r>
             <a:endParaRPr lang="en-US" dirty="0"/>
-          </a:p>
-          <a:p>
-            <a:r>
-              <a:rPr lang="en-US" dirty="0"/>
-              <a:t>Keep the drawing and the state modification separate!</a:t>
-            </a:r>
-          </a:p>
-          <a:p>
-            <a:endParaRPr lang="en-US" dirty="0"/>
-          </a:p>
-          <a:p>
-            <a:r>
-              <a:rPr lang="en-US" dirty="0"/>
-              <a:t>Some of this will be handled by a programming languages underlying graphics libraries.</a:t>
-            </a:r>
           </a:p>
         </p:txBody>
       </p:sp>
@@ -4454,7 +4469,7 @@
     </p:spTree>
     <p:extLst>
       <p:ext uri="{BB962C8B-B14F-4D97-AF65-F5344CB8AC3E}">
-        <p14:creationId xmlns:p14="http://schemas.microsoft.com/office/powerpoint/2010/main" val="831362513"/>
+        <p14:creationId xmlns:p14="http://schemas.microsoft.com/office/powerpoint/2010/main" val="360778685"/>
       </p:ext>
     </p:extLst>
   </p:cSld>
@@ -4498,7 +4513,7 @@
           <a:p>
             <a:r>
               <a:rPr lang="en-US" dirty="0"/>
-              <a:t>Architecture Big Picture</a:t>
+              <a:t>Drawing</a:t>
             </a:r>
           </a:p>
         </p:txBody>
@@ -4518,49 +4533,41 @@
           <a:bodyPr/>
           <a:lstStyle/>
           <a:p>
+            <a:r>
+              <a:rPr lang="en-US" dirty="0"/>
+              <a:t>Well, it needs to be fast!</a:t>
+            </a:r>
+          </a:p>
+          <a:p>
+            <a:pPr lvl="1"/>
+            <a:r>
+              <a:rPr lang="en-US" dirty="0"/>
+              <a:t>We want to do as little computation as possible</a:t>
+            </a:r>
+          </a:p>
+          <a:p>
+            <a:pPr lvl="1"/>
+            <a:r>
+              <a:rPr lang="en-US" dirty="0"/>
+              <a:t>Draw ONLY what’s on the screen!</a:t>
+            </a:r>
+          </a:p>
+          <a:p>
             <a:endParaRPr lang="en-US" dirty="0"/>
           </a:p>
           <a:p>
+            <a:r>
+              <a:rPr lang="en-US" dirty="0"/>
+              <a:t>Keep the drawing and the state modification separate!</a:t>
+            </a:r>
+          </a:p>
+          <a:p>
             <a:endParaRPr lang="en-US" dirty="0"/>
           </a:p>
           <a:p>
-            <a:endParaRPr lang="en-US" dirty="0"/>
-          </a:p>
-          <a:p>
-            <a:endParaRPr lang="en-US" dirty="0"/>
-          </a:p>
-          <a:p>
-            <a:endParaRPr lang="en-US" dirty="0"/>
-          </a:p>
-          <a:p>
-            <a:endParaRPr lang="en-US" dirty="0"/>
-          </a:p>
-          <a:p>
-            <a:endParaRPr lang="en-US" dirty="0"/>
-          </a:p>
-          <a:p>
-            <a:pPr marL="0" indent="0">
-              <a:buNone/>
-            </a:pPr>
-            <a:endParaRPr lang="en-US" sz="1200" dirty="0"/>
-          </a:p>
-          <a:p>
-            <a:pPr marL="0" indent="0">
-              <a:buNone/>
-            </a:pPr>
-            <a:endParaRPr lang="en-US" sz="1200"/>
-          </a:p>
-          <a:p>
-            <a:pPr marL="0" indent="0">
-              <a:buNone/>
-            </a:pPr>
-            <a:r>
-              <a:rPr lang="en-US" sz="1200"/>
-              <a:t>Credit</a:t>
-            </a:r>
-            <a:r>
-              <a:rPr lang="en-US" sz="1200" dirty="0"/>
-              <a:t>: Walker White</a:t>
+            <a:r>
+              <a:rPr lang="en-US" dirty="0"/>
+              <a:t>Some of this will be handled by a programming languages underlying graphics libraries.</a:t>
             </a:r>
           </a:p>
         </p:txBody>
@@ -4584,6 +4591,2356 @@
               <a:rPr lang="en-US" altLang="zh-CN" smtClean="0"/>
               <a:pPr/>
               <a:t>13</a:t>
+            </a:fld>
+            <a:endParaRPr lang="en-US" altLang="zh-CN"/>
+          </a:p>
+        </p:txBody>
+      </p:sp>
+    </p:spTree>
+    <p:extLst>
+      <p:ext uri="{BB962C8B-B14F-4D97-AF65-F5344CB8AC3E}">
+        <p14:creationId xmlns:p14="http://schemas.microsoft.com/office/powerpoint/2010/main" val="831362513"/>
+      </p:ext>
+    </p:extLst>
+  </p:cSld>
+  <p:clrMapOvr>
+    <a:masterClrMapping/>
+  </p:clrMapOvr>
+</p:sld>
+</file>
+
+<file path=ppt/slides/slide14.xml><?xml version="1.0" encoding="utf-8"?>
+<p:sld xmlns:a="http://schemas.openxmlformats.org/drawingml/2006/main" xmlns:r="http://schemas.openxmlformats.org/officeDocument/2006/relationships" xmlns:p="http://schemas.openxmlformats.org/presentationml/2006/main">
+  <p:cSld>
+    <p:spTree>
+      <p:nvGrpSpPr>
+        <p:cNvPr id="1" name=""/>
+        <p:cNvGrpSpPr/>
+        <p:nvPr/>
+      </p:nvGrpSpPr>
+      <p:grpSpPr>
+        <a:xfrm>
+          <a:off x="0" y="0"/>
+          <a:ext cx="0" cy="0"/>
+          <a:chOff x="0" y="0"/>
+          <a:chExt cx="0" cy="0"/>
+        </a:xfrm>
+      </p:grpSpPr>
+      <p:sp>
+        <p:nvSpPr>
+          <p:cNvPr id="2" name="Title 1"/>
+          <p:cNvSpPr>
+            <a:spLocks noGrp="1"/>
+          </p:cNvSpPr>
+          <p:nvPr>
+            <p:ph type="title"/>
+          </p:nvPr>
+        </p:nvSpPr>
+        <p:spPr/>
+        <p:txBody>
+          <a:bodyPr/>
+          <a:lstStyle/>
+          <a:p>
+            <a:r>
+              <a:rPr lang="en-US" dirty="0"/>
+              <a:t>Game Loop Structure</a:t>
+            </a:r>
+          </a:p>
+        </p:txBody>
+      </p:sp>
+      <p:sp>
+        <p:nvSpPr>
+          <p:cNvPr id="3" name="Content Placeholder 2"/>
+          <p:cNvSpPr>
+            <a:spLocks noGrp="1"/>
+          </p:cNvSpPr>
+          <p:nvPr>
+            <p:ph idx="1"/>
+          </p:nvPr>
+        </p:nvSpPr>
+        <p:spPr/>
+        <p:txBody>
+          <a:bodyPr/>
+          <a:lstStyle/>
+          <a:p>
+            <a:r>
+              <a:rPr lang="en-US" dirty="0"/>
+              <a:t>Let’s look at some issues with the game loop in a little bit more detail.</a:t>
+            </a:r>
+            <a:endParaRPr lang="en-US" sz="2800" i="1" dirty="0"/>
+          </a:p>
+        </p:txBody>
+      </p:sp>
+      <p:sp>
+        <p:nvSpPr>
+          <p:cNvPr id="4" name="Footer Placeholder 3"/>
+          <p:cNvSpPr>
+            <a:spLocks noGrp="1"/>
+          </p:cNvSpPr>
+          <p:nvPr>
+            <p:ph type="ftr" sz="quarter" idx="10"/>
+          </p:nvPr>
+        </p:nvSpPr>
+        <p:spPr/>
+        <p:txBody>
+          <a:bodyPr/>
+          <a:lstStyle/>
+          <a:p>
+            <a:fld id="{D0357299-C40C-42AB-B0C0-2E6E0A5A7F61}" type="slidenum">
+              <a:rPr lang="en-US" altLang="zh-CN" smtClean="0"/>
+              <a:pPr/>
+              <a:t>14</a:t>
+            </a:fld>
+            <a:endParaRPr lang="en-US" altLang="zh-CN"/>
+          </a:p>
+        </p:txBody>
+      </p:sp>
+    </p:spTree>
+    <p:extLst>
+      <p:ext uri="{BB962C8B-B14F-4D97-AF65-F5344CB8AC3E}">
+        <p14:creationId xmlns:p14="http://schemas.microsoft.com/office/powerpoint/2010/main" val="3520233600"/>
+      </p:ext>
+    </p:extLst>
+  </p:cSld>
+  <p:clrMapOvr>
+    <a:masterClrMapping/>
+  </p:clrMapOvr>
+</p:sld>
+</file>
+
+<file path=ppt/slides/slide15.xml><?xml version="1.0" encoding="utf-8"?>
+<p:sld xmlns:a="http://schemas.openxmlformats.org/drawingml/2006/main" xmlns:r="http://schemas.openxmlformats.org/officeDocument/2006/relationships" xmlns:p="http://schemas.openxmlformats.org/presentationml/2006/main">
+  <p:cSld>
+    <p:spTree>
+      <p:nvGrpSpPr>
+        <p:cNvPr id="1" name=""/>
+        <p:cNvGrpSpPr/>
+        <p:nvPr/>
+      </p:nvGrpSpPr>
+      <p:grpSpPr>
+        <a:xfrm>
+          <a:off x="0" y="0"/>
+          <a:ext cx="0" cy="0"/>
+          <a:chOff x="0" y="0"/>
+          <a:chExt cx="0" cy="0"/>
+        </a:xfrm>
+      </p:grpSpPr>
+      <p:sp>
+        <p:nvSpPr>
+          <p:cNvPr id="2" name="Title 1"/>
+          <p:cNvSpPr>
+            <a:spLocks noGrp="1"/>
+          </p:cNvSpPr>
+          <p:nvPr>
+            <p:ph type="title"/>
+          </p:nvPr>
+        </p:nvSpPr>
+        <p:spPr/>
+        <p:txBody>
+          <a:bodyPr/>
+          <a:lstStyle/>
+          <a:p>
+            <a:r>
+              <a:rPr lang="en-US" dirty="0"/>
+              <a:t>Game Loop Structure</a:t>
+            </a:r>
+          </a:p>
+        </p:txBody>
+      </p:sp>
+      <p:sp>
+        <p:nvSpPr>
+          <p:cNvPr id="3" name="Content Placeholder 2"/>
+          <p:cNvSpPr>
+            <a:spLocks noGrp="1"/>
+          </p:cNvSpPr>
+          <p:nvPr>
+            <p:ph idx="1"/>
+          </p:nvPr>
+        </p:nvSpPr>
+        <p:spPr/>
+        <p:txBody>
+          <a:bodyPr/>
+          <a:lstStyle/>
+          <a:p>
+            <a:r>
+              <a:rPr lang="en-US" dirty="0"/>
+              <a:t>A little more detail. Loop might look like:</a:t>
+            </a:r>
+          </a:p>
+          <a:p>
+            <a:pPr marL="0" indent="0">
+              <a:buNone/>
+            </a:pPr>
+            <a:endParaRPr lang="en-US" i="1" dirty="0"/>
+          </a:p>
+          <a:p>
+            <a:pPr marL="0" indent="0">
+              <a:buNone/>
+            </a:pPr>
+            <a:r>
+              <a:rPr lang="en-US" sz="2800" i="1" dirty="0"/>
+              <a:t>	While(!quit)</a:t>
+            </a:r>
+          </a:p>
+          <a:p>
+            <a:pPr marL="0" indent="0">
+              <a:buNone/>
+            </a:pPr>
+            <a:r>
+              <a:rPr lang="en-US" sz="2800" i="1" dirty="0"/>
+              <a:t>		</a:t>
+            </a:r>
+            <a:r>
+              <a:rPr lang="en-US" sz="2800" i="1" dirty="0" err="1"/>
+              <a:t>updateCamera</a:t>
+            </a:r>
+            <a:r>
+              <a:rPr lang="en-US" sz="2800" i="1" dirty="0"/>
+              <a:t>();</a:t>
+            </a:r>
+          </a:p>
+          <a:p>
+            <a:pPr marL="0" indent="0">
+              <a:buNone/>
+            </a:pPr>
+            <a:r>
+              <a:rPr lang="en-US" sz="2800" i="1" dirty="0"/>
+              <a:t>		</a:t>
+            </a:r>
+            <a:r>
+              <a:rPr lang="en-US" sz="2800" i="1" dirty="0" err="1"/>
+              <a:t>updateGameObjects</a:t>
+            </a:r>
+            <a:r>
+              <a:rPr lang="en-US" sz="2800" i="1" dirty="0"/>
+              <a:t>(); //includes input</a:t>
+            </a:r>
+          </a:p>
+          <a:p>
+            <a:pPr marL="0" indent="0">
+              <a:buNone/>
+            </a:pPr>
+            <a:r>
+              <a:rPr lang="en-US" sz="2800" i="1" dirty="0"/>
+              <a:t>		</a:t>
+            </a:r>
+            <a:r>
+              <a:rPr lang="en-US" sz="2800" i="1" dirty="0" err="1"/>
+              <a:t>renderScene</a:t>
+            </a:r>
+            <a:r>
+              <a:rPr lang="en-US" sz="2800" i="1" dirty="0"/>
+              <a:t>(); //to a back buffer</a:t>
+            </a:r>
+          </a:p>
+          <a:p>
+            <a:pPr marL="0" indent="0">
+              <a:buNone/>
+            </a:pPr>
+            <a:r>
+              <a:rPr lang="en-US" sz="2800" i="1" dirty="0"/>
+              <a:t>		</a:t>
+            </a:r>
+            <a:r>
+              <a:rPr lang="en-US" sz="2800" i="1" dirty="0" err="1"/>
+              <a:t>swapBuffers</a:t>
+            </a:r>
+            <a:r>
+              <a:rPr lang="en-US" sz="2800" i="1" dirty="0"/>
+              <a:t>(); //why?</a:t>
+            </a:r>
+          </a:p>
+        </p:txBody>
+      </p:sp>
+      <p:sp>
+        <p:nvSpPr>
+          <p:cNvPr id="4" name="Footer Placeholder 3"/>
+          <p:cNvSpPr>
+            <a:spLocks noGrp="1"/>
+          </p:cNvSpPr>
+          <p:nvPr>
+            <p:ph type="ftr" sz="quarter" idx="10"/>
+          </p:nvPr>
+        </p:nvSpPr>
+        <p:spPr/>
+        <p:txBody>
+          <a:bodyPr/>
+          <a:lstStyle/>
+          <a:p>
+            <a:fld id="{D0357299-C40C-42AB-B0C0-2E6E0A5A7F61}" type="slidenum">
+              <a:rPr lang="en-US" altLang="zh-CN" smtClean="0"/>
+              <a:pPr/>
+              <a:t>15</a:t>
+            </a:fld>
+            <a:endParaRPr lang="en-US" altLang="zh-CN"/>
+          </a:p>
+        </p:txBody>
+      </p:sp>
+    </p:spTree>
+    <p:extLst>
+      <p:ext uri="{BB962C8B-B14F-4D97-AF65-F5344CB8AC3E}">
+        <p14:creationId xmlns:p14="http://schemas.microsoft.com/office/powerpoint/2010/main" val="1458374563"/>
+      </p:ext>
+    </p:extLst>
+  </p:cSld>
+  <p:clrMapOvr>
+    <a:masterClrMapping/>
+  </p:clrMapOvr>
+</p:sld>
+</file>
+
+<file path=ppt/slides/slide16.xml><?xml version="1.0" encoding="utf-8"?>
+<p:sld xmlns:a="http://schemas.openxmlformats.org/drawingml/2006/main" xmlns:r="http://schemas.openxmlformats.org/officeDocument/2006/relationships" xmlns:p="http://schemas.openxmlformats.org/presentationml/2006/main">
+  <p:cSld>
+    <p:spTree>
+      <p:nvGrpSpPr>
+        <p:cNvPr id="1" name=""/>
+        <p:cNvGrpSpPr/>
+        <p:nvPr/>
+      </p:nvGrpSpPr>
+      <p:grpSpPr>
+        <a:xfrm>
+          <a:off x="0" y="0"/>
+          <a:ext cx="0" cy="0"/>
+          <a:chOff x="0" y="0"/>
+          <a:chExt cx="0" cy="0"/>
+        </a:xfrm>
+      </p:grpSpPr>
+      <p:sp>
+        <p:nvSpPr>
+          <p:cNvPr id="2" name="Title 1"/>
+          <p:cNvSpPr>
+            <a:spLocks noGrp="1"/>
+          </p:cNvSpPr>
+          <p:nvPr>
+            <p:ph type="title"/>
+          </p:nvPr>
+        </p:nvSpPr>
+        <p:spPr/>
+        <p:txBody>
+          <a:bodyPr/>
+          <a:lstStyle/>
+          <a:p>
+            <a:r>
+              <a:rPr lang="en-US" dirty="0"/>
+              <a:t>Framework Engines</a:t>
+            </a:r>
+          </a:p>
+        </p:txBody>
+      </p:sp>
+      <p:sp>
+        <p:nvSpPr>
+          <p:cNvPr id="3" name="Content Placeholder 2"/>
+          <p:cNvSpPr>
+            <a:spLocks noGrp="1"/>
+          </p:cNvSpPr>
+          <p:nvPr>
+            <p:ph idx="1"/>
+          </p:nvPr>
+        </p:nvSpPr>
+        <p:spPr/>
+        <p:txBody>
+          <a:bodyPr/>
+          <a:lstStyle/>
+          <a:p>
+            <a:pPr marL="0" indent="0">
+              <a:buNone/>
+            </a:pPr>
+            <a:r>
+              <a:rPr lang="en-US" sz="2800" dirty="0"/>
+              <a:t>A </a:t>
+            </a:r>
+            <a:r>
+              <a:rPr lang="en-US" sz="2800" b="1" i="1" dirty="0"/>
+              <a:t>framework engine </a:t>
+            </a:r>
+            <a:r>
+              <a:rPr lang="en-US" sz="2800" dirty="0"/>
+              <a:t>might leave some functionality of the game empty and allow programmers to easily override this functionality and “fill in the gaps”.</a:t>
+            </a:r>
+          </a:p>
+          <a:p>
+            <a:pPr marL="0" indent="0">
+              <a:buNone/>
+            </a:pPr>
+            <a:endParaRPr lang="en-US" sz="2800" dirty="0"/>
+          </a:p>
+          <a:p>
+            <a:pPr marL="0" indent="0">
+              <a:buNone/>
+            </a:pPr>
+            <a:r>
+              <a:rPr lang="en-US" sz="2800" dirty="0"/>
+              <a:t>Engines like Unity do this.</a:t>
+            </a:r>
+          </a:p>
+        </p:txBody>
+      </p:sp>
+      <p:sp>
+        <p:nvSpPr>
+          <p:cNvPr id="4" name="Footer Placeholder 3"/>
+          <p:cNvSpPr>
+            <a:spLocks noGrp="1"/>
+          </p:cNvSpPr>
+          <p:nvPr>
+            <p:ph type="ftr" sz="quarter" idx="10"/>
+          </p:nvPr>
+        </p:nvSpPr>
+        <p:spPr/>
+        <p:txBody>
+          <a:bodyPr/>
+          <a:lstStyle/>
+          <a:p>
+            <a:fld id="{D0357299-C40C-42AB-B0C0-2E6E0A5A7F61}" type="slidenum">
+              <a:rPr lang="en-US" altLang="zh-CN" smtClean="0"/>
+              <a:pPr/>
+              <a:t>16</a:t>
+            </a:fld>
+            <a:endParaRPr lang="en-US" altLang="zh-CN"/>
+          </a:p>
+        </p:txBody>
+      </p:sp>
+    </p:spTree>
+    <p:extLst>
+      <p:ext uri="{BB962C8B-B14F-4D97-AF65-F5344CB8AC3E}">
+        <p14:creationId xmlns:p14="http://schemas.microsoft.com/office/powerpoint/2010/main" val="1784207877"/>
+      </p:ext>
+    </p:extLst>
+  </p:cSld>
+  <p:clrMapOvr>
+    <a:masterClrMapping/>
+  </p:clrMapOvr>
+</p:sld>
+</file>
+
+<file path=ppt/slides/slide17.xml><?xml version="1.0" encoding="utf-8"?>
+<p:sld xmlns:a="http://schemas.openxmlformats.org/drawingml/2006/main" xmlns:r="http://schemas.openxmlformats.org/officeDocument/2006/relationships" xmlns:p="http://schemas.openxmlformats.org/presentationml/2006/main">
+  <p:cSld>
+    <p:spTree>
+      <p:nvGrpSpPr>
+        <p:cNvPr id="1" name=""/>
+        <p:cNvGrpSpPr/>
+        <p:nvPr/>
+      </p:nvGrpSpPr>
+      <p:grpSpPr>
+        <a:xfrm>
+          <a:off x="0" y="0"/>
+          <a:ext cx="0" cy="0"/>
+          <a:chOff x="0" y="0"/>
+          <a:chExt cx="0" cy="0"/>
+        </a:xfrm>
+      </p:grpSpPr>
+      <p:sp>
+        <p:nvSpPr>
+          <p:cNvPr id="2" name="Title 1"/>
+          <p:cNvSpPr>
+            <a:spLocks noGrp="1"/>
+          </p:cNvSpPr>
+          <p:nvPr>
+            <p:ph type="title"/>
+          </p:nvPr>
+        </p:nvSpPr>
+        <p:spPr/>
+        <p:txBody>
+          <a:bodyPr/>
+          <a:lstStyle/>
+          <a:p>
+            <a:r>
+              <a:rPr lang="en-US" dirty="0"/>
+              <a:t>Framework Engines</a:t>
+            </a:r>
+          </a:p>
+        </p:txBody>
+      </p:sp>
+      <p:sp>
+        <p:nvSpPr>
+          <p:cNvPr id="3" name="Content Placeholder 2"/>
+          <p:cNvSpPr>
+            <a:spLocks noGrp="1"/>
+          </p:cNvSpPr>
+          <p:nvPr>
+            <p:ph idx="1"/>
+          </p:nvPr>
+        </p:nvSpPr>
+        <p:spPr/>
+        <p:txBody>
+          <a:bodyPr/>
+          <a:lstStyle/>
+          <a:p>
+            <a:pPr marL="0" indent="0">
+              <a:buNone/>
+            </a:pPr>
+            <a:r>
+              <a:rPr lang="en-US" sz="2800" i="1" dirty="0"/>
+              <a:t>	While(!quit)</a:t>
+            </a:r>
+          </a:p>
+          <a:p>
+            <a:pPr marL="0" indent="0">
+              <a:buNone/>
+            </a:pPr>
+            <a:r>
+              <a:rPr lang="en-US" sz="2800" i="1" dirty="0"/>
+              <a:t>		for each </a:t>
+            </a:r>
+            <a:r>
+              <a:rPr lang="en-US" sz="2800" i="1" dirty="0" err="1"/>
+              <a:t>framelistener</a:t>
+            </a:r>
+            <a:r>
+              <a:rPr lang="en-US" sz="2800" i="1" dirty="0"/>
+              <a:t>:</a:t>
+            </a:r>
+          </a:p>
+          <a:p>
+            <a:pPr marL="0" indent="0">
+              <a:buNone/>
+            </a:pPr>
+            <a:r>
+              <a:rPr lang="en-US" sz="2800" i="1" dirty="0"/>
+              <a:t>			</a:t>
+            </a:r>
+            <a:r>
+              <a:rPr lang="en-US" sz="2800" i="1" dirty="0" err="1"/>
+              <a:t>listener.frameStarted</a:t>
+            </a:r>
+            <a:r>
+              <a:rPr lang="en-US" sz="2800" i="1" dirty="0"/>
+              <a:t>();</a:t>
+            </a:r>
+          </a:p>
+          <a:p>
+            <a:pPr marL="0" indent="0">
+              <a:buNone/>
+            </a:pPr>
+            <a:r>
+              <a:rPr lang="en-US" sz="2800" i="1" dirty="0"/>
+              <a:t>		for each game object:</a:t>
+            </a:r>
+          </a:p>
+          <a:p>
+            <a:pPr marL="0" indent="0">
+              <a:buNone/>
+            </a:pPr>
+            <a:r>
+              <a:rPr lang="en-US" sz="2800" i="1" dirty="0"/>
+              <a:t>			</a:t>
+            </a:r>
+            <a:r>
+              <a:rPr lang="en-US" sz="2800" i="1" dirty="0" err="1"/>
+              <a:t>object.update</a:t>
+            </a:r>
+            <a:r>
+              <a:rPr lang="en-US" sz="2800" i="1" dirty="0"/>
+              <a:t>();</a:t>
+            </a:r>
+          </a:p>
+          <a:p>
+            <a:pPr marL="0" indent="0">
+              <a:buNone/>
+            </a:pPr>
+            <a:r>
+              <a:rPr lang="en-US" sz="2800" i="1" dirty="0"/>
+              <a:t>		for each object:</a:t>
+            </a:r>
+          </a:p>
+          <a:p>
+            <a:pPr marL="0" indent="0">
+              <a:buNone/>
+            </a:pPr>
+            <a:r>
+              <a:rPr lang="en-US" sz="2800" i="1" dirty="0"/>
+              <a:t>			</a:t>
+            </a:r>
+            <a:r>
+              <a:rPr lang="en-US" sz="2800" i="1" dirty="0" err="1"/>
+              <a:t>object.draw</a:t>
+            </a:r>
+            <a:r>
+              <a:rPr lang="en-US" sz="2800" i="1" dirty="0"/>
+              <a:t>();</a:t>
+            </a:r>
+          </a:p>
+          <a:p>
+            <a:pPr marL="0" indent="0">
+              <a:buNone/>
+            </a:pPr>
+            <a:r>
+              <a:rPr lang="en-US" sz="2800" i="1" dirty="0"/>
+              <a:t>		for each </a:t>
+            </a:r>
+            <a:r>
+              <a:rPr lang="en-US" sz="2800" i="1" dirty="0" err="1"/>
+              <a:t>framelistener</a:t>
+            </a:r>
+            <a:r>
+              <a:rPr lang="en-US" sz="2800" i="1" dirty="0"/>
+              <a:t>:</a:t>
+            </a:r>
+          </a:p>
+          <a:p>
+            <a:pPr marL="0" indent="0">
+              <a:buNone/>
+            </a:pPr>
+            <a:r>
+              <a:rPr lang="en-US" sz="2800" i="1" dirty="0"/>
+              <a:t>			</a:t>
+            </a:r>
+            <a:r>
+              <a:rPr lang="en-US" sz="2800" i="1" dirty="0" err="1"/>
+              <a:t>listener.frameEnded</a:t>
+            </a:r>
+            <a:r>
+              <a:rPr lang="en-US" sz="2800" i="1" dirty="0"/>
+              <a:t>();</a:t>
+            </a:r>
+          </a:p>
+        </p:txBody>
+      </p:sp>
+      <p:sp>
+        <p:nvSpPr>
+          <p:cNvPr id="4" name="Footer Placeholder 3"/>
+          <p:cNvSpPr>
+            <a:spLocks noGrp="1"/>
+          </p:cNvSpPr>
+          <p:nvPr>
+            <p:ph type="ftr" sz="quarter" idx="10"/>
+          </p:nvPr>
+        </p:nvSpPr>
+        <p:spPr/>
+        <p:txBody>
+          <a:bodyPr/>
+          <a:lstStyle/>
+          <a:p>
+            <a:fld id="{D0357299-C40C-42AB-B0C0-2E6E0A5A7F61}" type="slidenum">
+              <a:rPr lang="en-US" altLang="zh-CN" smtClean="0"/>
+              <a:pPr/>
+              <a:t>17</a:t>
+            </a:fld>
+            <a:endParaRPr lang="en-US" altLang="zh-CN"/>
+          </a:p>
+        </p:txBody>
+      </p:sp>
+    </p:spTree>
+    <p:extLst>
+      <p:ext uri="{BB962C8B-B14F-4D97-AF65-F5344CB8AC3E}">
+        <p14:creationId xmlns:p14="http://schemas.microsoft.com/office/powerpoint/2010/main" val="2036849143"/>
+      </p:ext>
+    </p:extLst>
+  </p:cSld>
+  <p:clrMapOvr>
+    <a:masterClrMapping/>
+  </p:clrMapOvr>
+</p:sld>
+</file>
+
+<file path=ppt/slides/slide18.xml><?xml version="1.0" encoding="utf-8"?>
+<p:sld xmlns:a="http://schemas.openxmlformats.org/drawingml/2006/main" xmlns:r="http://schemas.openxmlformats.org/officeDocument/2006/relationships" xmlns:p="http://schemas.openxmlformats.org/presentationml/2006/main">
+  <p:cSld>
+    <p:spTree>
+      <p:nvGrpSpPr>
+        <p:cNvPr id="1" name=""/>
+        <p:cNvGrpSpPr/>
+        <p:nvPr/>
+      </p:nvGrpSpPr>
+      <p:grpSpPr>
+        <a:xfrm>
+          <a:off x="0" y="0"/>
+          <a:ext cx="0" cy="0"/>
+          <a:chOff x="0" y="0"/>
+          <a:chExt cx="0" cy="0"/>
+        </a:xfrm>
+      </p:grpSpPr>
+      <p:sp>
+        <p:nvSpPr>
+          <p:cNvPr id="2" name="Title 1"/>
+          <p:cNvSpPr>
+            <a:spLocks noGrp="1"/>
+          </p:cNvSpPr>
+          <p:nvPr>
+            <p:ph type="title"/>
+          </p:nvPr>
+        </p:nvSpPr>
+        <p:spPr/>
+        <p:txBody>
+          <a:bodyPr/>
+          <a:lstStyle/>
+          <a:p>
+            <a:r>
+              <a:rPr lang="en-US" dirty="0"/>
+              <a:t>Framework Engines</a:t>
+            </a:r>
+          </a:p>
+        </p:txBody>
+      </p:sp>
+      <p:sp>
+        <p:nvSpPr>
+          <p:cNvPr id="3" name="Content Placeholder 2"/>
+          <p:cNvSpPr>
+            <a:spLocks noGrp="1"/>
+          </p:cNvSpPr>
+          <p:nvPr>
+            <p:ph idx="1"/>
+          </p:nvPr>
+        </p:nvSpPr>
+        <p:spPr/>
+        <p:txBody>
+          <a:bodyPr/>
+          <a:lstStyle/>
+          <a:p>
+            <a:pPr marL="0" indent="0">
+              <a:buNone/>
+            </a:pPr>
+            <a:r>
+              <a:rPr lang="en-US" sz="2700" i="1" dirty="0"/>
+              <a:t>Class Player:</a:t>
+            </a:r>
+          </a:p>
+          <a:p>
+            <a:pPr marL="0" indent="0">
+              <a:buNone/>
+            </a:pPr>
+            <a:r>
+              <a:rPr lang="en-US" sz="2700" i="1" dirty="0"/>
+              <a:t>	</a:t>
+            </a:r>
+            <a:r>
+              <a:rPr lang="en-US" sz="2700" i="1" dirty="0" err="1"/>
+              <a:t>frameStarted</a:t>
+            </a:r>
+            <a:r>
+              <a:rPr lang="en-US" sz="2700" i="1" dirty="0"/>
+              <a:t>():</a:t>
+            </a:r>
+          </a:p>
+          <a:p>
+            <a:pPr marL="0" indent="0">
+              <a:buNone/>
+            </a:pPr>
+            <a:r>
+              <a:rPr lang="en-US" sz="2700" i="1" dirty="0"/>
+              <a:t>		//get input from controllers</a:t>
+            </a:r>
+          </a:p>
+          <a:p>
+            <a:pPr marL="0" indent="0">
+              <a:buNone/>
+            </a:pPr>
+            <a:r>
+              <a:rPr lang="en-US" sz="2700" i="1" dirty="0"/>
+              <a:t>		//calculate animation frames</a:t>
+            </a:r>
+          </a:p>
+          <a:p>
+            <a:pPr marL="0" indent="0">
+              <a:buNone/>
+            </a:pPr>
+            <a:r>
+              <a:rPr lang="en-US" sz="2700" i="1" dirty="0"/>
+              <a:t>	update():</a:t>
+            </a:r>
+          </a:p>
+          <a:p>
+            <a:pPr marL="0" indent="0">
+              <a:buNone/>
+            </a:pPr>
+            <a:r>
+              <a:rPr lang="en-US" sz="2700" i="1" dirty="0"/>
+              <a:t>		//change position, deduct health, etc.</a:t>
+            </a:r>
+          </a:p>
+          <a:p>
+            <a:pPr marL="0" indent="0">
+              <a:buNone/>
+            </a:pPr>
+            <a:r>
+              <a:rPr lang="en-US" sz="2700" i="1" dirty="0"/>
+              <a:t>	draw():</a:t>
+            </a:r>
+          </a:p>
+          <a:p>
+            <a:pPr marL="0" indent="0">
+              <a:buNone/>
+            </a:pPr>
+            <a:r>
+              <a:rPr lang="en-US" sz="2700" i="1" dirty="0"/>
+              <a:t>		//draw the sprite, etc.</a:t>
+            </a:r>
+          </a:p>
+          <a:p>
+            <a:pPr marL="0" indent="0">
+              <a:buNone/>
+            </a:pPr>
+            <a:r>
+              <a:rPr lang="en-US" sz="2700" i="1" dirty="0"/>
+              <a:t>	</a:t>
+            </a:r>
+            <a:r>
+              <a:rPr lang="en-US" sz="2700" i="1" dirty="0" err="1"/>
+              <a:t>frameEnded</a:t>
+            </a:r>
+            <a:r>
+              <a:rPr lang="en-US" sz="2700" i="1" dirty="0"/>
+              <a:t>():</a:t>
+            </a:r>
+          </a:p>
+          <a:p>
+            <a:pPr marL="0" indent="0">
+              <a:buNone/>
+            </a:pPr>
+            <a:r>
+              <a:rPr lang="en-US" sz="2700" i="1" dirty="0"/>
+              <a:t>		//Save data relevant for next frame?</a:t>
+            </a:r>
+          </a:p>
+        </p:txBody>
+      </p:sp>
+      <p:sp>
+        <p:nvSpPr>
+          <p:cNvPr id="4" name="Footer Placeholder 3"/>
+          <p:cNvSpPr>
+            <a:spLocks noGrp="1"/>
+          </p:cNvSpPr>
+          <p:nvPr>
+            <p:ph type="ftr" sz="quarter" idx="10"/>
+          </p:nvPr>
+        </p:nvSpPr>
+        <p:spPr/>
+        <p:txBody>
+          <a:bodyPr/>
+          <a:lstStyle/>
+          <a:p>
+            <a:fld id="{D0357299-C40C-42AB-B0C0-2E6E0A5A7F61}" type="slidenum">
+              <a:rPr lang="en-US" altLang="zh-CN" smtClean="0"/>
+              <a:pPr/>
+              <a:t>18</a:t>
+            </a:fld>
+            <a:endParaRPr lang="en-US" altLang="zh-CN"/>
+          </a:p>
+        </p:txBody>
+      </p:sp>
+    </p:spTree>
+    <p:extLst>
+      <p:ext uri="{BB962C8B-B14F-4D97-AF65-F5344CB8AC3E}">
+        <p14:creationId xmlns:p14="http://schemas.microsoft.com/office/powerpoint/2010/main" val="91784206"/>
+      </p:ext>
+    </p:extLst>
+  </p:cSld>
+  <p:clrMapOvr>
+    <a:masterClrMapping/>
+  </p:clrMapOvr>
+</p:sld>
+</file>
+
+<file path=ppt/slides/slide19.xml><?xml version="1.0" encoding="utf-8"?>
+<p:sld xmlns:a="http://schemas.openxmlformats.org/drawingml/2006/main" xmlns:r="http://schemas.openxmlformats.org/officeDocument/2006/relationships" xmlns:p="http://schemas.openxmlformats.org/presentationml/2006/main">
+  <p:cSld>
+    <p:spTree>
+      <p:nvGrpSpPr>
+        <p:cNvPr id="1" name=""/>
+        <p:cNvGrpSpPr/>
+        <p:nvPr/>
+      </p:nvGrpSpPr>
+      <p:grpSpPr>
+        <a:xfrm>
+          <a:off x="0" y="0"/>
+          <a:ext cx="0" cy="0"/>
+          <a:chOff x="0" y="0"/>
+          <a:chExt cx="0" cy="0"/>
+        </a:xfrm>
+      </p:grpSpPr>
+      <p:sp>
+        <p:nvSpPr>
+          <p:cNvPr id="2" name="Title 1"/>
+          <p:cNvSpPr>
+            <a:spLocks noGrp="1"/>
+          </p:cNvSpPr>
+          <p:nvPr>
+            <p:ph type="title"/>
+          </p:nvPr>
+        </p:nvSpPr>
+        <p:spPr/>
+        <p:txBody>
+          <a:bodyPr/>
+          <a:lstStyle/>
+          <a:p>
+            <a:r>
+              <a:rPr lang="en-US" dirty="0"/>
+              <a:t>Dealing with time</a:t>
+            </a:r>
+          </a:p>
+        </p:txBody>
+      </p:sp>
+      <p:sp>
+        <p:nvSpPr>
+          <p:cNvPr id="3" name="Content Placeholder 2"/>
+          <p:cNvSpPr>
+            <a:spLocks noGrp="1"/>
+          </p:cNvSpPr>
+          <p:nvPr>
+            <p:ph idx="1"/>
+          </p:nvPr>
+        </p:nvSpPr>
+        <p:spPr/>
+        <p:txBody>
+          <a:bodyPr/>
+          <a:lstStyle/>
+          <a:p>
+            <a:pPr marL="0" indent="0">
+              <a:buNone/>
+            </a:pPr>
+            <a:r>
+              <a:rPr lang="en-US" sz="2700" dirty="0"/>
+              <a:t>Games must deal with </a:t>
+            </a:r>
+            <a:r>
+              <a:rPr lang="en-US" sz="2700" b="1" i="1" dirty="0"/>
+              <a:t>time</a:t>
+            </a:r>
+            <a:r>
+              <a:rPr lang="en-US" sz="2700" dirty="0"/>
+              <a:t> in some way</a:t>
+            </a:r>
+          </a:p>
+          <a:p>
+            <a:pPr marL="0" indent="0">
+              <a:buNone/>
+            </a:pPr>
+            <a:endParaRPr lang="en-US" sz="2700" dirty="0"/>
+          </a:p>
+          <a:p>
+            <a:r>
+              <a:rPr lang="en-US" sz="2700" b="1" i="1" u="sng" dirty="0"/>
+              <a:t>Use frame time</a:t>
+            </a:r>
+            <a:r>
+              <a:rPr lang="en-US" sz="2700" dirty="0"/>
+              <a:t>: each frame is an equal unit of time. For example, character moves 5 pixels per frame. Many/most retro games use this (it is easier)</a:t>
+            </a:r>
+          </a:p>
+          <a:p>
+            <a:endParaRPr lang="en-US" sz="2700" dirty="0"/>
+          </a:p>
+          <a:p>
+            <a:r>
+              <a:rPr lang="en-US" sz="2700" b="1" i="1" u="sng" dirty="0"/>
+              <a:t>Use real time</a:t>
+            </a:r>
+            <a:r>
+              <a:rPr lang="en-US" sz="2700" dirty="0"/>
+              <a:t>: each frame measures the real time that has passed. Uses change in time to calculate new positions, etc. Most modern games use this.</a:t>
+            </a:r>
+          </a:p>
+        </p:txBody>
+      </p:sp>
+      <p:sp>
+        <p:nvSpPr>
+          <p:cNvPr id="4" name="Footer Placeholder 3"/>
+          <p:cNvSpPr>
+            <a:spLocks noGrp="1"/>
+          </p:cNvSpPr>
+          <p:nvPr>
+            <p:ph type="ftr" sz="quarter" idx="10"/>
+          </p:nvPr>
+        </p:nvSpPr>
+        <p:spPr/>
+        <p:txBody>
+          <a:bodyPr/>
+          <a:lstStyle/>
+          <a:p>
+            <a:fld id="{D0357299-C40C-42AB-B0C0-2E6E0A5A7F61}" type="slidenum">
+              <a:rPr lang="en-US" altLang="zh-CN" smtClean="0"/>
+              <a:pPr/>
+              <a:t>19</a:t>
+            </a:fld>
+            <a:endParaRPr lang="en-US" altLang="zh-CN"/>
+          </a:p>
+        </p:txBody>
+      </p:sp>
+    </p:spTree>
+    <p:extLst>
+      <p:ext uri="{BB962C8B-B14F-4D97-AF65-F5344CB8AC3E}">
+        <p14:creationId xmlns:p14="http://schemas.microsoft.com/office/powerpoint/2010/main" val="763613445"/>
+      </p:ext>
+    </p:extLst>
+  </p:cSld>
+  <p:clrMapOvr>
+    <a:masterClrMapping/>
+  </p:clrMapOvr>
+</p:sld>
+</file>
+
+<file path=ppt/slides/slide2.xml><?xml version="1.0" encoding="utf-8"?>
+<p:sld xmlns:a="http://schemas.openxmlformats.org/drawingml/2006/main" xmlns:r="http://schemas.openxmlformats.org/officeDocument/2006/relationships" xmlns:p="http://schemas.openxmlformats.org/presentationml/2006/main">
+  <p:cSld>
+    <p:spTree>
+      <p:nvGrpSpPr>
+        <p:cNvPr id="1" name=""/>
+        <p:cNvGrpSpPr/>
+        <p:nvPr/>
+      </p:nvGrpSpPr>
+      <p:grpSpPr>
+        <a:xfrm>
+          <a:off x="0" y="0"/>
+          <a:ext cx="0" cy="0"/>
+          <a:chOff x="0" y="0"/>
+          <a:chExt cx="0" cy="0"/>
+        </a:xfrm>
+      </p:grpSpPr>
+      <p:sp>
+        <p:nvSpPr>
+          <p:cNvPr id="2" name="Title 1"/>
+          <p:cNvSpPr>
+            <a:spLocks noGrp="1"/>
+          </p:cNvSpPr>
+          <p:nvPr>
+            <p:ph type="title"/>
+          </p:nvPr>
+        </p:nvSpPr>
+        <p:spPr/>
+        <p:txBody>
+          <a:bodyPr/>
+          <a:lstStyle/>
+          <a:p>
+            <a:r>
+              <a:rPr lang="en-US" dirty="0"/>
+              <a:t>Event-Driven Programming</a:t>
+            </a:r>
+          </a:p>
+        </p:txBody>
+      </p:sp>
+      <p:sp>
+        <p:nvSpPr>
+          <p:cNvPr id="3" name="Content Placeholder 2"/>
+          <p:cNvSpPr>
+            <a:spLocks noGrp="1"/>
+          </p:cNvSpPr>
+          <p:nvPr>
+            <p:ph idx="1"/>
+          </p:nvPr>
+        </p:nvSpPr>
+        <p:spPr/>
+        <p:txBody>
+          <a:bodyPr/>
+          <a:lstStyle/>
+          <a:p>
+            <a:r>
+              <a:rPr lang="en-US" dirty="0"/>
+              <a:t>Consider all the programs you’ve written up to this point</a:t>
+            </a:r>
+          </a:p>
+          <a:p>
+            <a:r>
+              <a:rPr lang="en-US" dirty="0"/>
+              <a:t>Did they do anything when the user didn’t ask for something?</a:t>
+            </a:r>
+          </a:p>
+          <a:p>
+            <a:r>
+              <a:rPr lang="en-US" dirty="0"/>
+              <a:t>Was there processing in the background?</a:t>
+            </a:r>
+          </a:p>
+          <a:p>
+            <a:r>
+              <a:rPr lang="en-US" dirty="0"/>
+              <a:t>Or did it mainly respond to user input?</a:t>
+            </a:r>
+          </a:p>
+        </p:txBody>
+      </p:sp>
+      <p:sp>
+        <p:nvSpPr>
+          <p:cNvPr id="4" name="Footer Placeholder 3"/>
+          <p:cNvSpPr>
+            <a:spLocks noGrp="1"/>
+          </p:cNvSpPr>
+          <p:nvPr>
+            <p:ph type="ftr" sz="quarter" idx="10"/>
+          </p:nvPr>
+        </p:nvSpPr>
+        <p:spPr/>
+        <p:txBody>
+          <a:bodyPr/>
+          <a:lstStyle/>
+          <a:p>
+            <a:fld id="{D0357299-C40C-42AB-B0C0-2E6E0A5A7F61}" type="slidenum">
+              <a:rPr lang="en-US" altLang="zh-CN" smtClean="0"/>
+              <a:pPr/>
+              <a:t>2</a:t>
+            </a:fld>
+            <a:endParaRPr lang="en-US" altLang="zh-CN"/>
+          </a:p>
+        </p:txBody>
+      </p:sp>
+    </p:spTree>
+    <p:extLst>
+      <p:ext uri="{BB962C8B-B14F-4D97-AF65-F5344CB8AC3E}">
+        <p14:creationId xmlns:p14="http://schemas.microsoft.com/office/powerpoint/2010/main" val="2514981305"/>
+      </p:ext>
+    </p:extLst>
+  </p:cSld>
+  <p:clrMapOvr>
+    <a:masterClrMapping/>
+  </p:clrMapOvr>
+</p:sld>
+</file>
+
+<file path=ppt/slides/slide20.xml><?xml version="1.0" encoding="utf-8"?>
+<p:sld xmlns:a="http://schemas.openxmlformats.org/drawingml/2006/main" xmlns:r="http://schemas.openxmlformats.org/officeDocument/2006/relationships" xmlns:p="http://schemas.openxmlformats.org/presentationml/2006/main">
+  <p:cSld>
+    <p:spTree>
+      <p:nvGrpSpPr>
+        <p:cNvPr id="1" name=""/>
+        <p:cNvGrpSpPr/>
+        <p:nvPr/>
+      </p:nvGrpSpPr>
+      <p:grpSpPr>
+        <a:xfrm>
+          <a:off x="0" y="0"/>
+          <a:ext cx="0" cy="0"/>
+          <a:chOff x="0" y="0"/>
+          <a:chExt cx="0" cy="0"/>
+        </a:xfrm>
+      </p:grpSpPr>
+      <p:sp>
+        <p:nvSpPr>
+          <p:cNvPr id="2" name="Title 1"/>
+          <p:cNvSpPr>
+            <a:spLocks noGrp="1"/>
+          </p:cNvSpPr>
+          <p:nvPr>
+            <p:ph type="title"/>
+          </p:nvPr>
+        </p:nvSpPr>
+        <p:spPr/>
+        <p:txBody>
+          <a:bodyPr/>
+          <a:lstStyle/>
+          <a:p>
+            <a:r>
+              <a:rPr lang="en-US" dirty="0"/>
+              <a:t>Dealing with time</a:t>
+            </a:r>
+          </a:p>
+        </p:txBody>
+      </p:sp>
+      <p:sp>
+        <p:nvSpPr>
+          <p:cNvPr id="3" name="Content Placeholder 2"/>
+          <p:cNvSpPr>
+            <a:spLocks noGrp="1"/>
+          </p:cNvSpPr>
+          <p:nvPr>
+            <p:ph idx="1"/>
+          </p:nvPr>
+        </p:nvSpPr>
+        <p:spPr/>
+        <p:txBody>
+          <a:bodyPr/>
+          <a:lstStyle/>
+          <a:p>
+            <a:pPr marL="0" indent="0">
+              <a:buNone/>
+            </a:pPr>
+            <a:endParaRPr lang="en-US" sz="2700" dirty="0"/>
+          </a:p>
+          <a:p>
+            <a:r>
+              <a:rPr lang="en-US" sz="2700" b="1" i="1" u="sng" dirty="0"/>
+              <a:t>Use frame time</a:t>
+            </a:r>
+            <a:r>
+              <a:rPr lang="en-US" sz="2700" dirty="0"/>
+              <a:t>: each frame is an equal unit of time. For example, character moves 5 pixels per frame. Many/most retro games use this (it is easier)</a:t>
+            </a:r>
+          </a:p>
+          <a:p>
+            <a:endParaRPr lang="en-US" sz="2700" dirty="0"/>
+          </a:p>
+          <a:p>
+            <a:r>
+              <a:rPr lang="en-US" sz="2700" dirty="0"/>
+              <a:t>No code needed for frame time. Just let the CPU rip!</a:t>
+            </a:r>
+          </a:p>
+        </p:txBody>
+      </p:sp>
+      <p:sp>
+        <p:nvSpPr>
+          <p:cNvPr id="4" name="Footer Placeholder 3"/>
+          <p:cNvSpPr>
+            <a:spLocks noGrp="1"/>
+          </p:cNvSpPr>
+          <p:nvPr>
+            <p:ph type="ftr" sz="quarter" idx="10"/>
+          </p:nvPr>
+        </p:nvSpPr>
+        <p:spPr/>
+        <p:txBody>
+          <a:bodyPr/>
+          <a:lstStyle/>
+          <a:p>
+            <a:fld id="{D0357299-C40C-42AB-B0C0-2E6E0A5A7F61}" type="slidenum">
+              <a:rPr lang="en-US" altLang="zh-CN" smtClean="0"/>
+              <a:pPr/>
+              <a:t>20</a:t>
+            </a:fld>
+            <a:endParaRPr lang="en-US" altLang="zh-CN"/>
+          </a:p>
+        </p:txBody>
+      </p:sp>
+    </p:spTree>
+    <p:extLst>
+      <p:ext uri="{BB962C8B-B14F-4D97-AF65-F5344CB8AC3E}">
+        <p14:creationId xmlns:p14="http://schemas.microsoft.com/office/powerpoint/2010/main" val="3584509992"/>
+      </p:ext>
+    </p:extLst>
+  </p:cSld>
+  <p:clrMapOvr>
+    <a:masterClrMapping/>
+  </p:clrMapOvr>
+</p:sld>
+</file>
+
+<file path=ppt/slides/slide21.xml><?xml version="1.0" encoding="utf-8"?>
+<p:sld xmlns:a="http://schemas.openxmlformats.org/drawingml/2006/main" xmlns:r="http://schemas.openxmlformats.org/officeDocument/2006/relationships" xmlns:p="http://schemas.openxmlformats.org/presentationml/2006/main">
+  <p:cSld>
+    <p:spTree>
+      <p:nvGrpSpPr>
+        <p:cNvPr id="1" name=""/>
+        <p:cNvGrpSpPr/>
+        <p:nvPr/>
+      </p:nvGrpSpPr>
+      <p:grpSpPr>
+        <a:xfrm>
+          <a:off x="0" y="0"/>
+          <a:ext cx="0" cy="0"/>
+          <a:chOff x="0" y="0"/>
+          <a:chExt cx="0" cy="0"/>
+        </a:xfrm>
+      </p:grpSpPr>
+      <p:sp>
+        <p:nvSpPr>
+          <p:cNvPr id="2" name="Title 1"/>
+          <p:cNvSpPr>
+            <a:spLocks noGrp="1"/>
+          </p:cNvSpPr>
+          <p:nvPr>
+            <p:ph type="title"/>
+          </p:nvPr>
+        </p:nvSpPr>
+        <p:spPr/>
+        <p:txBody>
+          <a:bodyPr/>
+          <a:lstStyle/>
+          <a:p>
+            <a:r>
+              <a:rPr lang="en-US" dirty="0"/>
+              <a:t>Dealing with time</a:t>
+            </a:r>
+          </a:p>
+        </p:txBody>
+      </p:sp>
+      <p:sp>
+        <p:nvSpPr>
+          <p:cNvPr id="3" name="Content Placeholder 2"/>
+          <p:cNvSpPr>
+            <a:spLocks noGrp="1"/>
+          </p:cNvSpPr>
+          <p:nvPr>
+            <p:ph idx="1"/>
+          </p:nvPr>
+        </p:nvSpPr>
+        <p:spPr/>
+        <p:txBody>
+          <a:bodyPr/>
+          <a:lstStyle/>
+          <a:p>
+            <a:r>
+              <a:rPr lang="en-US" sz="2700" b="1" i="1" u="sng" dirty="0"/>
+              <a:t>Use real time</a:t>
+            </a:r>
+            <a:r>
+              <a:rPr lang="en-US" sz="2700" dirty="0"/>
+              <a:t>: each frame measures the real time that has passed. </a:t>
+            </a:r>
+          </a:p>
+          <a:p>
+            <a:endParaRPr lang="en-US" sz="2700" dirty="0"/>
+          </a:p>
+          <a:p>
+            <a:pPr marL="0" indent="0">
+              <a:buNone/>
+            </a:pPr>
+            <a:r>
+              <a:rPr lang="en-US" sz="2700" i="1" dirty="0"/>
+              <a:t>Global </a:t>
+            </a:r>
+            <a:r>
+              <a:rPr lang="en-US" sz="2700" i="1" dirty="0" err="1"/>
+              <a:t>deltaT</a:t>
+            </a:r>
+            <a:r>
+              <a:rPr lang="en-US" sz="2700" i="1" dirty="0"/>
+              <a:t>;</a:t>
+            </a:r>
+          </a:p>
+          <a:p>
+            <a:pPr marL="0" indent="0">
+              <a:buNone/>
+            </a:pPr>
+            <a:r>
+              <a:rPr lang="en-US" sz="2700" i="1" dirty="0"/>
+              <a:t>While(!quit):</a:t>
+            </a:r>
+          </a:p>
+          <a:p>
+            <a:pPr marL="0" indent="0">
+              <a:buNone/>
+            </a:pPr>
+            <a:r>
+              <a:rPr lang="en-US" sz="2700" i="1" dirty="0"/>
+              <a:t>	start = </a:t>
+            </a:r>
+            <a:r>
+              <a:rPr lang="en-US" sz="2700" i="1" dirty="0" err="1"/>
+              <a:t>cpu.getTime</a:t>
+            </a:r>
+            <a:r>
+              <a:rPr lang="en-US" sz="2700" i="1" dirty="0"/>
+              <a:t>();</a:t>
+            </a:r>
+          </a:p>
+          <a:p>
+            <a:pPr marL="0" indent="0">
+              <a:buNone/>
+            </a:pPr>
+            <a:r>
+              <a:rPr lang="en-US" sz="2700" i="1" dirty="0"/>
+              <a:t>	//do other update, drawing, etc.</a:t>
+            </a:r>
+          </a:p>
+          <a:p>
+            <a:pPr marL="0" indent="0">
+              <a:buNone/>
+            </a:pPr>
+            <a:r>
+              <a:rPr lang="en-US" sz="2700" i="1" dirty="0"/>
+              <a:t>	e.g., </a:t>
+            </a:r>
+            <a:r>
+              <a:rPr lang="en-US" sz="2700" i="1" dirty="0" err="1"/>
+              <a:t>gameObject.update</a:t>
+            </a:r>
+            <a:r>
+              <a:rPr lang="en-US" sz="2700" i="1" dirty="0"/>
+              <a:t>(</a:t>
+            </a:r>
+            <a:r>
+              <a:rPr lang="en-US" sz="2700" i="1" dirty="0" err="1"/>
+              <a:t>deltaT</a:t>
+            </a:r>
+            <a:r>
+              <a:rPr lang="en-US" sz="2700" i="1" dirty="0"/>
+              <a:t>); </a:t>
+            </a:r>
+            <a:r>
+              <a:rPr lang="en-US" sz="1500" i="1" dirty="0"/>
+              <a:t>//note delta from last frame</a:t>
+            </a:r>
+          </a:p>
+          <a:p>
+            <a:pPr marL="0" indent="0">
+              <a:buNone/>
+            </a:pPr>
+            <a:r>
+              <a:rPr lang="en-US" sz="2700" i="1" dirty="0"/>
+              <a:t>	end = </a:t>
+            </a:r>
+            <a:r>
+              <a:rPr lang="en-US" sz="2700" i="1" dirty="0" err="1"/>
+              <a:t>cpu.getTime</a:t>
+            </a:r>
+            <a:r>
+              <a:rPr lang="en-US" sz="2700" i="1" dirty="0"/>
+              <a:t>();</a:t>
+            </a:r>
+          </a:p>
+          <a:p>
+            <a:pPr marL="0" indent="0">
+              <a:buNone/>
+            </a:pPr>
+            <a:r>
+              <a:rPr lang="en-US" sz="2700" i="1" dirty="0"/>
+              <a:t>	</a:t>
+            </a:r>
+            <a:r>
+              <a:rPr lang="en-US" sz="2700" i="1" dirty="0" err="1"/>
+              <a:t>deltaT</a:t>
+            </a:r>
+            <a:r>
+              <a:rPr lang="en-US" sz="2700" i="1" dirty="0"/>
+              <a:t> = end – start;</a:t>
+            </a:r>
+          </a:p>
+        </p:txBody>
+      </p:sp>
+      <p:sp>
+        <p:nvSpPr>
+          <p:cNvPr id="4" name="Footer Placeholder 3"/>
+          <p:cNvSpPr>
+            <a:spLocks noGrp="1"/>
+          </p:cNvSpPr>
+          <p:nvPr>
+            <p:ph type="ftr" sz="quarter" idx="10"/>
+          </p:nvPr>
+        </p:nvSpPr>
+        <p:spPr/>
+        <p:txBody>
+          <a:bodyPr/>
+          <a:lstStyle/>
+          <a:p>
+            <a:fld id="{D0357299-C40C-42AB-B0C0-2E6E0A5A7F61}" type="slidenum">
+              <a:rPr lang="en-US" altLang="zh-CN" smtClean="0"/>
+              <a:pPr/>
+              <a:t>21</a:t>
+            </a:fld>
+            <a:endParaRPr lang="en-US" altLang="zh-CN"/>
+          </a:p>
+        </p:txBody>
+      </p:sp>
+    </p:spTree>
+    <p:extLst>
+      <p:ext uri="{BB962C8B-B14F-4D97-AF65-F5344CB8AC3E}">
+        <p14:creationId xmlns:p14="http://schemas.microsoft.com/office/powerpoint/2010/main" val="1011844002"/>
+      </p:ext>
+    </p:extLst>
+  </p:cSld>
+  <p:clrMapOvr>
+    <a:masterClrMapping/>
+  </p:clrMapOvr>
+</p:sld>
+</file>
+
+<file path=ppt/slides/slide22.xml><?xml version="1.0" encoding="utf-8"?>
+<p:sld xmlns:a="http://schemas.openxmlformats.org/drawingml/2006/main" xmlns:r="http://schemas.openxmlformats.org/officeDocument/2006/relationships" xmlns:p="http://schemas.openxmlformats.org/presentationml/2006/main">
+  <p:cSld>
+    <p:spTree>
+      <p:nvGrpSpPr>
+        <p:cNvPr id="1" name=""/>
+        <p:cNvGrpSpPr/>
+        <p:nvPr/>
+      </p:nvGrpSpPr>
+      <p:grpSpPr>
+        <a:xfrm>
+          <a:off x="0" y="0"/>
+          <a:ext cx="0" cy="0"/>
+          <a:chOff x="0" y="0"/>
+          <a:chExt cx="0" cy="0"/>
+        </a:xfrm>
+      </p:grpSpPr>
+      <p:sp>
+        <p:nvSpPr>
+          <p:cNvPr id="2" name="Title 1"/>
+          <p:cNvSpPr>
+            <a:spLocks noGrp="1"/>
+          </p:cNvSpPr>
+          <p:nvPr>
+            <p:ph type="title"/>
+          </p:nvPr>
+        </p:nvSpPr>
+        <p:spPr/>
+        <p:txBody>
+          <a:bodyPr/>
+          <a:lstStyle/>
+          <a:p>
+            <a:r>
+              <a:rPr lang="en-US" dirty="0"/>
+              <a:t>Dealing with time</a:t>
+            </a:r>
+          </a:p>
+        </p:txBody>
+      </p:sp>
+      <p:sp>
+        <p:nvSpPr>
+          <p:cNvPr id="3" name="Content Placeholder 2"/>
+          <p:cNvSpPr>
+            <a:spLocks noGrp="1"/>
+          </p:cNvSpPr>
+          <p:nvPr>
+            <p:ph idx="1"/>
+          </p:nvPr>
+        </p:nvSpPr>
+        <p:spPr/>
+        <p:txBody>
+          <a:bodyPr/>
+          <a:lstStyle/>
+          <a:p>
+            <a:pPr marL="0" indent="0">
+              <a:buNone/>
+            </a:pPr>
+            <a:r>
+              <a:rPr lang="en-US" sz="2700" dirty="0"/>
+              <a:t>A couple small issues with using </a:t>
+            </a:r>
+            <a:r>
+              <a:rPr lang="en-US" sz="2700" dirty="0" err="1"/>
+              <a:t>deltaT</a:t>
+            </a:r>
+            <a:r>
+              <a:rPr lang="en-US" sz="2700" dirty="0"/>
+              <a:t> in games:</a:t>
+            </a:r>
+          </a:p>
+          <a:p>
+            <a:pPr marL="0" indent="0">
+              <a:buNone/>
+            </a:pPr>
+            <a:endParaRPr lang="en-US" sz="2700" dirty="0"/>
+          </a:p>
+          <a:p>
+            <a:pPr>
+              <a:buFontTx/>
+              <a:buChar char="-"/>
+            </a:pPr>
+            <a:r>
+              <a:rPr lang="en-US" sz="2700" b="1" i="1" u="sng" dirty="0"/>
+              <a:t>Small problem 1</a:t>
+            </a:r>
+            <a:r>
+              <a:rPr lang="en-US" sz="2700" dirty="0"/>
+              <a:t>: The code on previous slide is subject to ”jerky” performance if frame rate dips or spikes suddenly. You’ll get a few very slow or very fast frames.</a:t>
+            </a:r>
+          </a:p>
+          <a:p>
+            <a:pPr>
+              <a:buFontTx/>
+              <a:buChar char="-"/>
+            </a:pPr>
+            <a:r>
+              <a:rPr lang="en-US" sz="2700" b="1" i="1" u="sng" dirty="0"/>
+              <a:t>Solution</a:t>
+            </a:r>
+            <a:r>
+              <a:rPr lang="en-US" sz="2700" dirty="0"/>
+              <a:t>: Some engines will use a running average of the last ‘x’ frames to estimate </a:t>
+            </a:r>
+            <a:r>
+              <a:rPr lang="en-US" sz="2700" dirty="0" err="1"/>
+              <a:t>deltaT</a:t>
+            </a:r>
+            <a:r>
+              <a:rPr lang="en-US" sz="2700" dirty="0"/>
+              <a:t>. This smooths out the effects of any short sudden changes in frame rate.</a:t>
+            </a:r>
+          </a:p>
+          <a:p>
+            <a:pPr lvl="1">
+              <a:buFontTx/>
+              <a:buChar char="-"/>
+            </a:pPr>
+            <a:r>
+              <a:rPr lang="en-US" sz="2300" dirty="0"/>
+              <a:t>But also means your simulation is not “correct”</a:t>
+            </a:r>
+          </a:p>
+        </p:txBody>
+      </p:sp>
+      <p:sp>
+        <p:nvSpPr>
+          <p:cNvPr id="4" name="Footer Placeholder 3"/>
+          <p:cNvSpPr>
+            <a:spLocks noGrp="1"/>
+          </p:cNvSpPr>
+          <p:nvPr>
+            <p:ph type="ftr" sz="quarter" idx="10"/>
+          </p:nvPr>
+        </p:nvSpPr>
+        <p:spPr/>
+        <p:txBody>
+          <a:bodyPr/>
+          <a:lstStyle/>
+          <a:p>
+            <a:fld id="{D0357299-C40C-42AB-B0C0-2E6E0A5A7F61}" type="slidenum">
+              <a:rPr lang="en-US" altLang="zh-CN" smtClean="0"/>
+              <a:pPr/>
+              <a:t>22</a:t>
+            </a:fld>
+            <a:endParaRPr lang="en-US" altLang="zh-CN"/>
+          </a:p>
+        </p:txBody>
+      </p:sp>
+    </p:spTree>
+    <p:extLst>
+      <p:ext uri="{BB962C8B-B14F-4D97-AF65-F5344CB8AC3E}">
+        <p14:creationId xmlns:p14="http://schemas.microsoft.com/office/powerpoint/2010/main" val="3431082812"/>
+      </p:ext>
+    </p:extLst>
+  </p:cSld>
+  <p:clrMapOvr>
+    <a:masterClrMapping/>
+  </p:clrMapOvr>
+</p:sld>
+</file>
+
+<file path=ppt/slides/slide23.xml><?xml version="1.0" encoding="utf-8"?>
+<p:sld xmlns:a="http://schemas.openxmlformats.org/drawingml/2006/main" xmlns:r="http://schemas.openxmlformats.org/officeDocument/2006/relationships" xmlns:p="http://schemas.openxmlformats.org/presentationml/2006/main">
+  <p:cSld>
+    <p:spTree>
+      <p:nvGrpSpPr>
+        <p:cNvPr id="1" name=""/>
+        <p:cNvGrpSpPr/>
+        <p:nvPr/>
+      </p:nvGrpSpPr>
+      <p:grpSpPr>
+        <a:xfrm>
+          <a:off x="0" y="0"/>
+          <a:ext cx="0" cy="0"/>
+          <a:chOff x="0" y="0"/>
+          <a:chExt cx="0" cy="0"/>
+        </a:xfrm>
+      </p:grpSpPr>
+      <p:sp>
+        <p:nvSpPr>
+          <p:cNvPr id="2" name="Title 1"/>
+          <p:cNvSpPr>
+            <a:spLocks noGrp="1"/>
+          </p:cNvSpPr>
+          <p:nvPr>
+            <p:ph type="title"/>
+          </p:nvPr>
+        </p:nvSpPr>
+        <p:spPr/>
+        <p:txBody>
+          <a:bodyPr/>
+          <a:lstStyle/>
+          <a:p>
+            <a:r>
+              <a:rPr lang="en-US" dirty="0"/>
+              <a:t>Dealing with time</a:t>
+            </a:r>
+          </a:p>
+        </p:txBody>
+      </p:sp>
+      <p:sp>
+        <p:nvSpPr>
+          <p:cNvPr id="3" name="Content Placeholder 2"/>
+          <p:cNvSpPr>
+            <a:spLocks noGrp="1"/>
+          </p:cNvSpPr>
+          <p:nvPr>
+            <p:ph idx="1"/>
+          </p:nvPr>
+        </p:nvSpPr>
+        <p:spPr/>
+        <p:txBody>
+          <a:bodyPr/>
+          <a:lstStyle/>
+          <a:p>
+            <a:pPr marL="0" indent="0">
+              <a:buNone/>
+            </a:pPr>
+            <a:r>
+              <a:rPr lang="en-US" sz="2700" dirty="0"/>
+              <a:t>A couple small issues with using </a:t>
+            </a:r>
+            <a:r>
+              <a:rPr lang="en-US" sz="2700" dirty="0" err="1"/>
+              <a:t>deltaT</a:t>
+            </a:r>
+            <a:r>
+              <a:rPr lang="en-US" sz="2700" dirty="0"/>
+              <a:t> in games:</a:t>
+            </a:r>
+          </a:p>
+          <a:p>
+            <a:pPr marL="0" indent="0">
+              <a:buNone/>
+            </a:pPr>
+            <a:endParaRPr lang="en-US" sz="2700" dirty="0"/>
+          </a:p>
+          <a:p>
+            <a:pPr>
+              <a:buFontTx/>
+              <a:buChar char="-"/>
+            </a:pPr>
+            <a:r>
+              <a:rPr lang="en-US" sz="2700" b="1" i="1" u="sng" dirty="0"/>
+              <a:t>Small problem 2</a:t>
+            </a:r>
+            <a:r>
+              <a:rPr lang="en-US" sz="2700" dirty="0"/>
+              <a:t>: </a:t>
+            </a:r>
+            <a:r>
+              <a:rPr lang="en-US" sz="2700" dirty="0" err="1"/>
+              <a:t>deltaT</a:t>
+            </a:r>
+            <a:r>
+              <a:rPr lang="en-US" sz="2700" dirty="0"/>
+              <a:t> will have a lot of small variation as the </a:t>
+            </a:r>
+            <a:r>
+              <a:rPr lang="en-US" sz="2700" dirty="0" err="1"/>
+              <a:t>cpu</a:t>
+            </a:r>
+            <a:r>
+              <a:rPr lang="en-US" sz="2700" dirty="0"/>
+              <a:t> has some fast and some slow frames and past times are being used to predict speed of this frame</a:t>
+            </a:r>
+          </a:p>
+          <a:p>
+            <a:pPr>
+              <a:buFontTx/>
+              <a:buChar char="-"/>
+            </a:pPr>
+            <a:r>
+              <a:rPr lang="en-US" sz="2700" b="1" i="1" u="sng" dirty="0"/>
+              <a:t>Solution</a:t>
+            </a:r>
+            <a:r>
+              <a:rPr lang="en-US" sz="2700" dirty="0"/>
+              <a:t>: </a:t>
+            </a:r>
+            <a:r>
+              <a:rPr lang="en-US" sz="2700" b="1" dirty="0"/>
+              <a:t>Frame governing</a:t>
+            </a:r>
+            <a:r>
+              <a:rPr lang="en-US" sz="2700" dirty="0"/>
+              <a:t> is a technique in which the engine specifically only lets the game loop execute at the desired framerate (e.g., once every 1/60 second)</a:t>
+            </a:r>
+          </a:p>
+          <a:p>
+            <a:pPr lvl="1">
+              <a:buFontTx/>
+              <a:buChar char="-"/>
+            </a:pPr>
+            <a:r>
+              <a:rPr lang="en-US" sz="1900" dirty="0"/>
+              <a:t>If previous frame ends early, just sit and wait for the next frame time</a:t>
+            </a:r>
+          </a:p>
+          <a:p>
+            <a:pPr lvl="1">
+              <a:buFontTx/>
+              <a:buChar char="-"/>
+            </a:pPr>
+            <a:r>
+              <a:rPr lang="en-US" sz="1900" dirty="0"/>
+              <a:t>If previous frame is late, skip a frame until you get to the next one.</a:t>
+            </a:r>
+          </a:p>
+          <a:p>
+            <a:pPr lvl="1">
+              <a:buFontTx/>
+              <a:buChar char="-"/>
+            </a:pPr>
+            <a:r>
+              <a:rPr lang="en-US" sz="1900" dirty="0"/>
+              <a:t>Some systems (particularly physics systems) work best when operating at a consistent frame rate.</a:t>
+            </a:r>
+          </a:p>
+        </p:txBody>
+      </p:sp>
+      <p:sp>
+        <p:nvSpPr>
+          <p:cNvPr id="4" name="Footer Placeholder 3"/>
+          <p:cNvSpPr>
+            <a:spLocks noGrp="1"/>
+          </p:cNvSpPr>
+          <p:nvPr>
+            <p:ph type="ftr" sz="quarter" idx="10"/>
+          </p:nvPr>
+        </p:nvSpPr>
+        <p:spPr/>
+        <p:txBody>
+          <a:bodyPr/>
+          <a:lstStyle/>
+          <a:p>
+            <a:fld id="{D0357299-C40C-42AB-B0C0-2E6E0A5A7F61}" type="slidenum">
+              <a:rPr lang="en-US" altLang="zh-CN" smtClean="0"/>
+              <a:pPr/>
+              <a:t>23</a:t>
+            </a:fld>
+            <a:endParaRPr lang="en-US" altLang="zh-CN"/>
+          </a:p>
+        </p:txBody>
+      </p:sp>
+    </p:spTree>
+    <p:extLst>
+      <p:ext uri="{BB962C8B-B14F-4D97-AF65-F5344CB8AC3E}">
+        <p14:creationId xmlns:p14="http://schemas.microsoft.com/office/powerpoint/2010/main" val="169391542"/>
+      </p:ext>
+    </p:extLst>
+  </p:cSld>
+  <p:clrMapOvr>
+    <a:masterClrMapping/>
+  </p:clrMapOvr>
+</p:sld>
+</file>
+
+<file path=ppt/slides/slide24.xml><?xml version="1.0" encoding="utf-8"?>
+<p:sld xmlns:a="http://schemas.openxmlformats.org/drawingml/2006/main" xmlns:r="http://schemas.openxmlformats.org/officeDocument/2006/relationships" xmlns:p="http://schemas.openxmlformats.org/presentationml/2006/main">
+  <p:cSld>
+    <p:spTree>
+      <p:nvGrpSpPr>
+        <p:cNvPr id="1" name=""/>
+        <p:cNvGrpSpPr/>
+        <p:nvPr/>
+      </p:nvGrpSpPr>
+      <p:grpSpPr>
+        <a:xfrm>
+          <a:off x="0" y="0"/>
+          <a:ext cx="0" cy="0"/>
+          <a:chOff x="0" y="0"/>
+          <a:chExt cx="0" cy="0"/>
+        </a:xfrm>
+      </p:grpSpPr>
+      <p:sp>
+        <p:nvSpPr>
+          <p:cNvPr id="2" name="Title 1"/>
+          <p:cNvSpPr>
+            <a:spLocks noGrp="1"/>
+          </p:cNvSpPr>
+          <p:nvPr>
+            <p:ph type="title"/>
+          </p:nvPr>
+        </p:nvSpPr>
+        <p:spPr/>
+        <p:txBody>
+          <a:bodyPr/>
+          <a:lstStyle/>
+          <a:p>
+            <a:r>
+              <a:rPr lang="en-US" dirty="0"/>
+              <a:t>Two final definitions</a:t>
+            </a:r>
+          </a:p>
+        </p:txBody>
+      </p:sp>
+      <p:sp>
+        <p:nvSpPr>
+          <p:cNvPr id="3" name="Content Placeholder 2"/>
+          <p:cNvSpPr>
+            <a:spLocks noGrp="1"/>
+          </p:cNvSpPr>
+          <p:nvPr>
+            <p:ph idx="1"/>
+          </p:nvPr>
+        </p:nvSpPr>
+        <p:spPr/>
+        <p:txBody>
+          <a:bodyPr/>
+          <a:lstStyle/>
+          <a:p>
+            <a:pPr>
+              <a:buFontTx/>
+              <a:buChar char="-"/>
+            </a:pPr>
+            <a:r>
+              <a:rPr lang="en-US" sz="2700" b="1" i="1" u="sng" dirty="0"/>
+              <a:t>Frame Buffering</a:t>
+            </a:r>
+            <a:r>
+              <a:rPr lang="en-US" sz="2700" dirty="0"/>
+              <a:t>: Earlier we talked about “swapping the buffers”. Drawing usually works by drawing to a back buffer (a second image) which is swapped all at once with the current frame.</a:t>
+            </a:r>
+          </a:p>
+          <a:p>
+            <a:pPr marL="0" indent="0">
+              <a:buNone/>
+            </a:pPr>
+            <a:endParaRPr lang="en-US" sz="2700" dirty="0"/>
+          </a:p>
+          <a:p>
+            <a:pPr>
+              <a:buFontTx/>
+              <a:buChar char="-"/>
+            </a:pPr>
+            <a:r>
+              <a:rPr lang="en-US" sz="2700" b="1" i="1" u="sng" dirty="0"/>
+              <a:t>Screen Tearing</a:t>
+            </a:r>
+            <a:r>
+              <a:rPr lang="en-US" sz="2700" dirty="0"/>
+              <a:t>: Occurs when the back buffer is not fully drawn when the swap occurs. Player sees part of old frame and part of new frame.</a:t>
+            </a:r>
+          </a:p>
+          <a:p>
+            <a:pPr lvl="1">
+              <a:buFontTx/>
+              <a:buChar char="-"/>
+            </a:pPr>
+            <a:r>
+              <a:rPr lang="en-US" sz="2300" dirty="0"/>
+              <a:t>Drawing wasn’t fast enough, the swap happening too early!</a:t>
+            </a:r>
+            <a:endParaRPr lang="en-US" sz="1900" dirty="0"/>
+          </a:p>
+        </p:txBody>
+      </p:sp>
+      <p:sp>
+        <p:nvSpPr>
+          <p:cNvPr id="4" name="Footer Placeholder 3"/>
+          <p:cNvSpPr>
+            <a:spLocks noGrp="1"/>
+          </p:cNvSpPr>
+          <p:nvPr>
+            <p:ph type="ftr" sz="quarter" idx="10"/>
+          </p:nvPr>
+        </p:nvSpPr>
+        <p:spPr/>
+        <p:txBody>
+          <a:bodyPr/>
+          <a:lstStyle/>
+          <a:p>
+            <a:fld id="{D0357299-C40C-42AB-B0C0-2E6E0A5A7F61}" type="slidenum">
+              <a:rPr lang="en-US" altLang="zh-CN" smtClean="0"/>
+              <a:pPr/>
+              <a:t>24</a:t>
+            </a:fld>
+            <a:endParaRPr lang="en-US" altLang="zh-CN"/>
+          </a:p>
+        </p:txBody>
+      </p:sp>
+    </p:spTree>
+    <p:extLst>
+      <p:ext uri="{BB962C8B-B14F-4D97-AF65-F5344CB8AC3E}">
+        <p14:creationId xmlns:p14="http://schemas.microsoft.com/office/powerpoint/2010/main" val="2558302001"/>
+      </p:ext>
+    </p:extLst>
+  </p:cSld>
+  <p:clrMapOvr>
+    <a:masterClrMapping/>
+  </p:clrMapOvr>
+</p:sld>
+</file>
+
+<file path=ppt/slides/slide25.xml><?xml version="1.0" encoding="utf-8"?>
+<p:sld xmlns:a="http://schemas.openxmlformats.org/drawingml/2006/main" xmlns:r="http://schemas.openxmlformats.org/officeDocument/2006/relationships" xmlns:p="http://schemas.openxmlformats.org/presentationml/2006/main">
+  <p:cSld>
+    <p:spTree>
+      <p:nvGrpSpPr>
+        <p:cNvPr id="1" name=""/>
+        <p:cNvGrpSpPr/>
+        <p:nvPr/>
+      </p:nvGrpSpPr>
+      <p:grpSpPr>
+        <a:xfrm>
+          <a:off x="0" y="0"/>
+          <a:ext cx="0" cy="0"/>
+          <a:chOff x="0" y="0"/>
+          <a:chExt cx="0" cy="0"/>
+        </a:xfrm>
+      </p:grpSpPr>
+      <p:sp>
+        <p:nvSpPr>
+          <p:cNvPr id="2" name="Title 1"/>
+          <p:cNvSpPr>
+            <a:spLocks noGrp="1"/>
+          </p:cNvSpPr>
+          <p:nvPr>
+            <p:ph type="title"/>
+          </p:nvPr>
+        </p:nvSpPr>
+        <p:spPr/>
+        <p:txBody>
+          <a:bodyPr/>
+          <a:lstStyle/>
+          <a:p>
+            <a:r>
+              <a:rPr lang="en-US" dirty="0"/>
+              <a:t>Two final definitions</a:t>
+            </a:r>
+          </a:p>
+        </p:txBody>
+      </p:sp>
+      <p:sp>
+        <p:nvSpPr>
+          <p:cNvPr id="3" name="Content Placeholder 2"/>
+          <p:cNvSpPr>
+            <a:spLocks noGrp="1"/>
+          </p:cNvSpPr>
+          <p:nvPr>
+            <p:ph idx="1"/>
+          </p:nvPr>
+        </p:nvSpPr>
+        <p:spPr/>
+        <p:txBody>
+          <a:bodyPr/>
+          <a:lstStyle/>
+          <a:p>
+            <a:pPr>
+              <a:buFontTx/>
+              <a:buChar char="-"/>
+            </a:pPr>
+            <a:r>
+              <a:rPr lang="en-US" sz="2700" b="1" i="1" u="sng" dirty="0"/>
+              <a:t>V-Sync</a:t>
+            </a:r>
+            <a:r>
+              <a:rPr lang="en-US" sz="2700" dirty="0"/>
+              <a:t>: A technology that throttles your game, not switching the back buffer until it is fully written too. If this causes you to miss a frame, then you wait for the next one.</a:t>
+            </a:r>
+          </a:p>
+          <a:p>
+            <a:pPr lvl="1">
+              <a:buFontTx/>
+              <a:buChar char="-"/>
+            </a:pPr>
+            <a:r>
+              <a:rPr lang="en-US" sz="2300" dirty="0"/>
+              <a:t>Solves screen tearing, but is a form of </a:t>
+            </a:r>
+            <a:r>
+              <a:rPr lang="en-US" sz="2300" b="1" i="1" u="sng" dirty="0"/>
+              <a:t>frame governing</a:t>
+            </a:r>
+            <a:r>
+              <a:rPr lang="en-US" sz="2300" dirty="0"/>
+              <a:t>. Can cause performance to drop</a:t>
+            </a:r>
+          </a:p>
+        </p:txBody>
+      </p:sp>
+      <p:sp>
+        <p:nvSpPr>
+          <p:cNvPr id="4" name="Footer Placeholder 3"/>
+          <p:cNvSpPr>
+            <a:spLocks noGrp="1"/>
+          </p:cNvSpPr>
+          <p:nvPr>
+            <p:ph type="ftr" sz="quarter" idx="10"/>
+          </p:nvPr>
+        </p:nvSpPr>
+        <p:spPr/>
+        <p:txBody>
+          <a:bodyPr/>
+          <a:lstStyle/>
+          <a:p>
+            <a:fld id="{D0357299-C40C-42AB-B0C0-2E6E0A5A7F61}" type="slidenum">
+              <a:rPr lang="en-US" altLang="zh-CN" smtClean="0"/>
+              <a:pPr/>
+              <a:t>25</a:t>
+            </a:fld>
+            <a:endParaRPr lang="en-US" altLang="zh-CN"/>
+          </a:p>
+        </p:txBody>
+      </p:sp>
+    </p:spTree>
+    <p:extLst>
+      <p:ext uri="{BB962C8B-B14F-4D97-AF65-F5344CB8AC3E}">
+        <p14:creationId xmlns:p14="http://schemas.microsoft.com/office/powerpoint/2010/main" val="4044057903"/>
+      </p:ext>
+    </p:extLst>
+  </p:cSld>
+  <p:clrMapOvr>
+    <a:masterClrMapping/>
+  </p:clrMapOvr>
+</p:sld>
+</file>
+
+<file path=ppt/slides/slide26.xml><?xml version="1.0" encoding="utf-8"?>
+<p:sld xmlns:a="http://schemas.openxmlformats.org/drawingml/2006/main" xmlns:r="http://schemas.openxmlformats.org/officeDocument/2006/relationships" xmlns:p="http://schemas.openxmlformats.org/presentationml/2006/main">
+  <p:cSld>
+    <p:spTree>
+      <p:nvGrpSpPr>
+        <p:cNvPr id="1" name=""/>
+        <p:cNvGrpSpPr/>
+        <p:nvPr/>
+      </p:nvGrpSpPr>
+      <p:grpSpPr>
+        <a:xfrm>
+          <a:off x="0" y="0"/>
+          <a:ext cx="0" cy="0"/>
+          <a:chOff x="0" y="0"/>
+          <a:chExt cx="0" cy="0"/>
+        </a:xfrm>
+      </p:grpSpPr>
+      <p:sp>
+        <p:nvSpPr>
+          <p:cNvPr id="2" name="Title 1"/>
+          <p:cNvSpPr>
+            <a:spLocks noGrp="1"/>
+          </p:cNvSpPr>
+          <p:nvPr>
+            <p:ph type="title"/>
+          </p:nvPr>
+        </p:nvSpPr>
+        <p:spPr/>
+        <p:txBody>
+          <a:bodyPr/>
+          <a:lstStyle/>
+          <a:p>
+            <a:r>
+              <a:rPr lang="en-US" dirty="0"/>
+              <a:t>Conclusion</a:t>
+            </a:r>
+          </a:p>
+        </p:txBody>
+      </p:sp>
+      <p:sp>
+        <p:nvSpPr>
+          <p:cNvPr id="3" name="Content Placeholder 2"/>
+          <p:cNvSpPr>
+            <a:spLocks noGrp="1"/>
+          </p:cNvSpPr>
+          <p:nvPr>
+            <p:ph idx="1"/>
+          </p:nvPr>
+        </p:nvSpPr>
+        <p:spPr/>
+        <p:txBody>
+          <a:bodyPr/>
+          <a:lstStyle/>
+          <a:p>
+            <a:pPr>
+              <a:buFontTx/>
+              <a:buChar char="-"/>
+            </a:pPr>
+            <a:r>
+              <a:rPr lang="en-US" dirty="0"/>
+              <a:t>We now know a little bit about:</a:t>
+            </a:r>
+          </a:p>
+          <a:p>
+            <a:pPr lvl="1">
+              <a:buFontTx/>
+              <a:buChar char="-"/>
+            </a:pPr>
+            <a:r>
+              <a:rPr lang="en-US" sz="2400" dirty="0"/>
+              <a:t>Game loops, how they are structured, pros and cons</a:t>
+            </a:r>
+          </a:p>
+          <a:p>
+            <a:pPr lvl="1">
+              <a:buFontTx/>
+              <a:buChar char="-"/>
+            </a:pPr>
+            <a:r>
+              <a:rPr lang="en-US" sz="2400" dirty="0"/>
+              <a:t>Updating game objects to produce simulation</a:t>
+            </a:r>
+          </a:p>
+          <a:p>
+            <a:pPr lvl="2">
+              <a:buFontTx/>
+              <a:buChar char="-"/>
+            </a:pPr>
+            <a:r>
+              <a:rPr lang="en-US" dirty="0"/>
+              <a:t>You’re code will almost exclusively be doing this!!</a:t>
+            </a:r>
+          </a:p>
+          <a:p>
+            <a:pPr lvl="1">
+              <a:buFontTx/>
+              <a:buChar char="-"/>
+            </a:pPr>
+            <a:r>
+              <a:rPr lang="en-US" sz="2400" dirty="0"/>
+              <a:t>Drawing frames and some of the issues involved.</a:t>
+            </a:r>
+          </a:p>
+          <a:p>
+            <a:pPr lvl="2">
+              <a:buFontTx/>
+              <a:buChar char="-"/>
+            </a:pPr>
+            <a:r>
+              <a:rPr lang="en-US" dirty="0"/>
+              <a:t>A game engine (like Unity) will handle almost ALL of this for you (yay!)</a:t>
+            </a:r>
+          </a:p>
+          <a:p>
+            <a:pPr lvl="1">
+              <a:buFontTx/>
+              <a:buChar char="-"/>
+            </a:pPr>
+            <a:r>
+              <a:rPr lang="en-US" sz="2400" dirty="0"/>
+              <a:t>Dealing with time in games</a:t>
+            </a:r>
+          </a:p>
+          <a:p>
+            <a:pPr lvl="2">
+              <a:buFontTx/>
+              <a:buChar char="-"/>
+            </a:pPr>
+            <a:r>
+              <a:rPr lang="en-US" dirty="0"/>
+              <a:t>Lots of options and techniques. Choose what you prefer / need. Unity offers ways to use different options.</a:t>
+            </a:r>
+          </a:p>
+          <a:p>
+            <a:pPr lvl="1">
+              <a:buFontTx/>
+              <a:buChar char="-"/>
+            </a:pPr>
+            <a:endParaRPr lang="en-US" sz="1500" dirty="0"/>
+          </a:p>
+        </p:txBody>
+      </p:sp>
+      <p:sp>
+        <p:nvSpPr>
+          <p:cNvPr id="4" name="Footer Placeholder 3"/>
+          <p:cNvSpPr>
+            <a:spLocks noGrp="1"/>
+          </p:cNvSpPr>
+          <p:nvPr>
+            <p:ph type="ftr" sz="quarter" idx="10"/>
+          </p:nvPr>
+        </p:nvSpPr>
+        <p:spPr/>
+        <p:txBody>
+          <a:bodyPr/>
+          <a:lstStyle/>
+          <a:p>
+            <a:fld id="{D0357299-C40C-42AB-B0C0-2E6E0A5A7F61}" type="slidenum">
+              <a:rPr lang="en-US" altLang="zh-CN" smtClean="0"/>
+              <a:pPr/>
+              <a:t>26</a:t>
+            </a:fld>
+            <a:endParaRPr lang="en-US" altLang="zh-CN"/>
+          </a:p>
+        </p:txBody>
+      </p:sp>
+    </p:spTree>
+    <p:extLst>
+      <p:ext uri="{BB962C8B-B14F-4D97-AF65-F5344CB8AC3E}">
+        <p14:creationId xmlns:p14="http://schemas.microsoft.com/office/powerpoint/2010/main" val="3996571691"/>
+      </p:ext>
+    </p:extLst>
+  </p:cSld>
+  <p:clrMapOvr>
+    <a:masterClrMapping/>
+  </p:clrMapOvr>
+</p:sld>
+</file>
+
+<file path=ppt/slides/slide27.xml><?xml version="1.0" encoding="utf-8"?>
+<p:sld xmlns:a="http://schemas.openxmlformats.org/drawingml/2006/main" xmlns:r="http://schemas.openxmlformats.org/officeDocument/2006/relationships" xmlns:p="http://schemas.openxmlformats.org/presentationml/2006/main">
+  <p:cSld>
+    <p:spTree>
+      <p:nvGrpSpPr>
+        <p:cNvPr id="1" name=""/>
+        <p:cNvGrpSpPr/>
+        <p:nvPr/>
+      </p:nvGrpSpPr>
+      <p:grpSpPr>
+        <a:xfrm>
+          <a:off x="0" y="0"/>
+          <a:ext cx="0" cy="0"/>
+          <a:chOff x="0" y="0"/>
+          <a:chExt cx="0" cy="0"/>
+        </a:xfrm>
+      </p:grpSpPr>
+      <p:sp>
+        <p:nvSpPr>
+          <p:cNvPr id="2" name="Title 1"/>
+          <p:cNvSpPr>
+            <a:spLocks noGrp="1"/>
+          </p:cNvSpPr>
+          <p:nvPr>
+            <p:ph type="title"/>
+          </p:nvPr>
+        </p:nvSpPr>
+        <p:spPr/>
+        <p:txBody>
+          <a:bodyPr/>
+          <a:lstStyle/>
+          <a:p>
+            <a:r>
+              <a:rPr lang="en-US" dirty="0"/>
+              <a:t>Architecture Big Picture</a:t>
+            </a:r>
+          </a:p>
+        </p:txBody>
+      </p:sp>
+      <p:sp>
+        <p:nvSpPr>
+          <p:cNvPr id="3" name="Content Placeholder 2"/>
+          <p:cNvSpPr>
+            <a:spLocks noGrp="1"/>
+          </p:cNvSpPr>
+          <p:nvPr>
+            <p:ph idx="1"/>
+          </p:nvPr>
+        </p:nvSpPr>
+        <p:spPr/>
+        <p:txBody>
+          <a:bodyPr/>
+          <a:lstStyle/>
+          <a:p>
+            <a:endParaRPr lang="en-US" dirty="0"/>
+          </a:p>
+          <a:p>
+            <a:endParaRPr lang="en-US" dirty="0"/>
+          </a:p>
+          <a:p>
+            <a:endParaRPr lang="en-US" dirty="0"/>
+          </a:p>
+          <a:p>
+            <a:endParaRPr lang="en-US" dirty="0"/>
+          </a:p>
+          <a:p>
+            <a:endParaRPr lang="en-US" dirty="0"/>
+          </a:p>
+          <a:p>
+            <a:endParaRPr lang="en-US" dirty="0"/>
+          </a:p>
+          <a:p>
+            <a:endParaRPr lang="en-US" dirty="0"/>
+          </a:p>
+          <a:p>
+            <a:pPr marL="0" indent="0">
+              <a:buNone/>
+            </a:pPr>
+            <a:endParaRPr lang="en-US" sz="1200" dirty="0"/>
+          </a:p>
+          <a:p>
+            <a:pPr marL="0" indent="0">
+              <a:buNone/>
+            </a:pPr>
+            <a:endParaRPr lang="en-US" sz="1200"/>
+          </a:p>
+          <a:p>
+            <a:pPr marL="0" indent="0">
+              <a:buNone/>
+            </a:pPr>
+            <a:r>
+              <a:rPr lang="en-US" sz="1200"/>
+              <a:t>Credit</a:t>
+            </a:r>
+            <a:r>
+              <a:rPr lang="en-US" sz="1200" dirty="0"/>
+              <a:t>: Walker White</a:t>
+            </a:r>
+          </a:p>
+        </p:txBody>
+      </p:sp>
+      <p:sp>
+        <p:nvSpPr>
+          <p:cNvPr id="4" name="Footer Placeholder 3"/>
+          <p:cNvSpPr>
+            <a:spLocks noGrp="1"/>
+          </p:cNvSpPr>
+          <p:nvPr>
+            <p:ph type="ftr" sz="quarter" idx="10"/>
+          </p:nvPr>
+        </p:nvSpPr>
+        <p:spPr/>
+        <p:txBody>
+          <a:bodyPr/>
+          <a:lstStyle/>
+          <a:p>
+            <a:fld id="{D0357299-C40C-42AB-B0C0-2E6E0A5A7F61}" type="slidenum">
+              <a:rPr lang="en-US" altLang="zh-CN" smtClean="0"/>
+              <a:pPr/>
+              <a:t>27</a:t>
             </a:fld>
             <a:endParaRPr lang="en-US" altLang="zh-CN"/>
           </a:p>
@@ -4632,7 +6989,216 @@
 </p:sld>
 </file>
 
-<file path=ppt/slides/slide14.xml><?xml version="1.0" encoding="utf-8"?>
+<file path=ppt/slides/slide28.xml><?xml version="1.0" encoding="utf-8"?>
+<p:sld xmlns:a="http://schemas.openxmlformats.org/drawingml/2006/main" xmlns:r="http://schemas.openxmlformats.org/officeDocument/2006/relationships" xmlns:p="http://schemas.openxmlformats.org/presentationml/2006/main" show="0">
+  <p:cSld>
+    <p:spTree>
+      <p:nvGrpSpPr>
+        <p:cNvPr id="1" name=""/>
+        <p:cNvGrpSpPr/>
+        <p:nvPr/>
+      </p:nvGrpSpPr>
+      <p:grpSpPr>
+        <a:xfrm>
+          <a:off x="0" y="0"/>
+          <a:ext cx="0" cy="0"/>
+          <a:chOff x="0" y="0"/>
+          <a:chExt cx="0" cy="0"/>
+        </a:xfrm>
+      </p:grpSpPr>
+      <p:sp>
+        <p:nvSpPr>
+          <p:cNvPr id="2" name="Title 1"/>
+          <p:cNvSpPr>
+            <a:spLocks noGrp="1"/>
+          </p:cNvSpPr>
+          <p:nvPr>
+            <p:ph type="title"/>
+          </p:nvPr>
+        </p:nvSpPr>
+        <p:spPr/>
+        <p:txBody>
+          <a:bodyPr/>
+          <a:lstStyle/>
+          <a:p>
+            <a:r>
+              <a:rPr lang="en-US" dirty="0"/>
+              <a:t>SDL2</a:t>
+            </a:r>
+          </a:p>
+        </p:txBody>
+      </p:sp>
+      <p:sp>
+        <p:nvSpPr>
+          <p:cNvPr id="3" name="Text Placeholder 2"/>
+          <p:cNvSpPr>
+            <a:spLocks noGrp="1"/>
+          </p:cNvSpPr>
+          <p:nvPr>
+            <p:ph type="body" idx="1"/>
+          </p:nvPr>
+        </p:nvSpPr>
+        <p:spPr/>
+        <p:txBody>
+          <a:bodyPr/>
+          <a:lstStyle/>
+          <a:p>
+            <a:endParaRPr lang="en-US" dirty="0"/>
+          </a:p>
+        </p:txBody>
+      </p:sp>
+      <p:sp>
+        <p:nvSpPr>
+          <p:cNvPr id="4" name="Footer Placeholder 3"/>
+          <p:cNvSpPr>
+            <a:spLocks noGrp="1"/>
+          </p:cNvSpPr>
+          <p:nvPr>
+            <p:ph type="ftr" sz="quarter" idx="10"/>
+          </p:nvPr>
+        </p:nvSpPr>
+        <p:spPr/>
+        <p:txBody>
+          <a:bodyPr/>
+          <a:lstStyle/>
+          <a:p>
+            <a:fld id="{FA2F35AA-A946-4799-AE91-DFCF9FD1ED3C}" type="slidenum">
+              <a:rPr lang="en-US" altLang="zh-CN" smtClean="0"/>
+              <a:pPr/>
+              <a:t>28</a:t>
+            </a:fld>
+            <a:endParaRPr lang="en-US" altLang="zh-CN"/>
+          </a:p>
+        </p:txBody>
+      </p:sp>
+    </p:spTree>
+    <p:extLst>
+      <p:ext uri="{BB962C8B-B14F-4D97-AF65-F5344CB8AC3E}">
+        <p14:creationId xmlns:p14="http://schemas.microsoft.com/office/powerpoint/2010/main" val="430721581"/>
+      </p:ext>
+    </p:extLst>
+  </p:cSld>
+  <p:clrMapOvr>
+    <a:masterClrMapping/>
+  </p:clrMapOvr>
+</p:sld>
+</file>
+
+<file path=ppt/slides/slide29.xml><?xml version="1.0" encoding="utf-8"?>
+<p:sld xmlns:a="http://schemas.openxmlformats.org/drawingml/2006/main" xmlns:r="http://schemas.openxmlformats.org/officeDocument/2006/relationships" xmlns:p="http://schemas.openxmlformats.org/presentationml/2006/main" show="0">
+  <p:cSld>
+    <p:spTree>
+      <p:nvGrpSpPr>
+        <p:cNvPr id="1" name=""/>
+        <p:cNvGrpSpPr/>
+        <p:nvPr/>
+      </p:nvGrpSpPr>
+      <p:grpSpPr>
+        <a:xfrm>
+          <a:off x="0" y="0"/>
+          <a:ext cx="0" cy="0"/>
+          <a:chOff x="0" y="0"/>
+          <a:chExt cx="0" cy="0"/>
+        </a:xfrm>
+      </p:grpSpPr>
+      <p:sp>
+        <p:nvSpPr>
+          <p:cNvPr id="2" name="Title 1"/>
+          <p:cNvSpPr>
+            <a:spLocks noGrp="1"/>
+          </p:cNvSpPr>
+          <p:nvPr>
+            <p:ph type="title"/>
+          </p:nvPr>
+        </p:nvSpPr>
+        <p:spPr/>
+        <p:txBody>
+          <a:bodyPr/>
+          <a:lstStyle/>
+          <a:p>
+            <a:r>
+              <a:rPr lang="en-US" dirty="0"/>
+              <a:t>SDL2</a:t>
+            </a:r>
+          </a:p>
+        </p:txBody>
+      </p:sp>
+      <p:sp>
+        <p:nvSpPr>
+          <p:cNvPr id="3" name="Content Placeholder 2"/>
+          <p:cNvSpPr>
+            <a:spLocks noGrp="1"/>
+          </p:cNvSpPr>
+          <p:nvPr>
+            <p:ph idx="1"/>
+          </p:nvPr>
+        </p:nvSpPr>
+        <p:spPr/>
+        <p:txBody>
+          <a:bodyPr/>
+          <a:lstStyle/>
+          <a:p>
+            <a:r>
+              <a:rPr lang="en-US" dirty="0"/>
+              <a:t>SDL is a simple media library that allows drawing images to screen, and other simple graphics based tasks.</a:t>
+            </a:r>
+          </a:p>
+          <a:p>
+            <a:endParaRPr lang="en-US" dirty="0"/>
+          </a:p>
+          <a:p>
+            <a:r>
+              <a:rPr lang="en-US" dirty="0"/>
+              <a:t>These slides serve as a quick introduction to the library</a:t>
+            </a:r>
+          </a:p>
+          <a:p>
+            <a:pPr lvl="1"/>
+            <a:r>
+              <a:rPr lang="en-US" dirty="0"/>
+              <a:t>i.e., the SDL code that is provided in the starter pack for the class.</a:t>
+            </a:r>
+          </a:p>
+        </p:txBody>
+      </p:sp>
+      <p:sp>
+        <p:nvSpPr>
+          <p:cNvPr id="4" name="Footer Placeholder 3"/>
+          <p:cNvSpPr>
+            <a:spLocks noGrp="1"/>
+          </p:cNvSpPr>
+          <p:nvPr>
+            <p:ph type="ftr" sz="quarter" idx="10"/>
+          </p:nvPr>
+        </p:nvSpPr>
+        <p:spPr/>
+        <p:txBody>
+          <a:bodyPr/>
+          <a:lstStyle/>
+          <a:p>
+            <a:fld id="{D0357299-C40C-42AB-B0C0-2E6E0A5A7F61}" type="slidenum">
+              <a:rPr lang="en-US" altLang="zh-CN" smtClean="0"/>
+              <a:pPr/>
+              <a:t>29</a:t>
+            </a:fld>
+            <a:endParaRPr lang="en-US" altLang="zh-CN"/>
+          </a:p>
+        </p:txBody>
+      </p:sp>
+    </p:spTree>
+    <p:extLst>
+      <p:ext uri="{BB962C8B-B14F-4D97-AF65-F5344CB8AC3E}">
+        <p14:creationId xmlns:p14="http://schemas.microsoft.com/office/powerpoint/2010/main" val="1824298685"/>
+      </p:ext>
+    </p:extLst>
+  </p:cSld>
+  <p:clrMapOvr>
+    <a:masterClrMapping/>
+  </p:clrMapOvr>
+</p:sld>
+</file>
+
+<file path=ppt/slides/slide3.xml><?xml version="1.0" encoding="utf-8"?>
 <p:sld xmlns:a="http://schemas.openxmlformats.org/drawingml/2006/main" xmlns:r="http://schemas.openxmlformats.org/officeDocument/2006/relationships" xmlns:p="http://schemas.openxmlformats.org/presentationml/2006/main">
   <p:cSld>
     <p:spTree>
@@ -4666,19 +7232,19 @@
           <a:p>
             <a:r>
               <a:rPr lang="en-US" dirty="0"/>
-              <a:t>SDL2</a:t>
-            </a:r>
-          </a:p>
-        </p:txBody>
-      </p:sp>
-      <p:sp>
-        <p:nvSpPr>
-          <p:cNvPr id="3" name="Text Placeholder 2"/>
+              <a:t>Event-Driven Programming</a:t>
+            </a:r>
+          </a:p>
+        </p:txBody>
+      </p:sp>
+      <p:sp>
+        <p:nvSpPr>
+          <p:cNvPr id="3" name="Content Placeholder 2"/>
           <p:cNvSpPr>
             <a:spLocks noGrp="1"/>
           </p:cNvSpPr>
           <p:nvPr>
-            <p:ph type="body" idx="1"/>
+            <p:ph idx="1"/>
           </p:nvPr>
         </p:nvSpPr>
         <p:spPr/>
@@ -4686,8 +7252,41 @@
           <a:bodyPr/>
           <a:lstStyle/>
           <a:p>
+            <a:r>
+              <a:rPr lang="en-US" dirty="0"/>
+              <a:t>The event-driven paradigm works great for a lot of systems</a:t>
+            </a:r>
+          </a:p>
+          <a:p>
+            <a:pPr lvl="1"/>
+            <a:r>
+              <a:rPr lang="en-US" dirty="0"/>
+              <a:t>Web (we REALLY want this!)</a:t>
+            </a:r>
+          </a:p>
+          <a:p>
+            <a:pPr lvl="1"/>
+            <a:r>
+              <a:rPr lang="en-US" dirty="0"/>
+              <a:t>Mobile</a:t>
+            </a:r>
+          </a:p>
+          <a:p>
+            <a:pPr lvl="1"/>
+            <a:r>
+              <a:rPr lang="en-US" dirty="0"/>
+              <a:t>Office apps</a:t>
+            </a:r>
+          </a:p>
+          <a:p>
             <a:endParaRPr lang="en-US" dirty="0"/>
           </a:p>
+          <a:p>
+            <a:r>
+              <a:rPr lang="en-US" dirty="0"/>
+              <a:t>Well, yea…games use A LOT of event programming, but we’ll get there soon enough.</a:t>
+            </a:r>
+          </a:p>
         </p:txBody>
       </p:sp>
       <p:sp>
@@ -4705,10 +7304,10 @@
           <a:bodyPr/>
           <a:lstStyle/>
           <a:p>
-            <a:fld id="{FA2F35AA-A946-4799-AE91-DFCF9FD1ED3C}" type="slidenum">
+            <a:fld id="{D0357299-C40C-42AB-B0C0-2E6E0A5A7F61}" type="slidenum">
               <a:rPr lang="en-US" altLang="zh-CN" smtClean="0"/>
               <a:pPr/>
-              <a:t>14</a:t>
+              <a:t>3</a:t>
             </a:fld>
             <a:endParaRPr lang="en-US" altLang="zh-CN"/>
           </a:p>
@@ -4717,7 +7316,7 @@
     </p:spTree>
     <p:extLst>
       <p:ext uri="{BB962C8B-B14F-4D97-AF65-F5344CB8AC3E}">
-        <p14:creationId xmlns:p14="http://schemas.microsoft.com/office/powerpoint/2010/main" val="430721581"/>
+        <p14:creationId xmlns:p14="http://schemas.microsoft.com/office/powerpoint/2010/main" val="134252993"/>
       </p:ext>
     </p:extLst>
   </p:cSld>
@@ -4727,122 +7326,8 @@
 </p:sld>
 </file>
 
-<file path=ppt/slides/slide15.xml><?xml version="1.0" encoding="utf-8"?>
-<p:sld xmlns:a="http://schemas.openxmlformats.org/drawingml/2006/main" xmlns:r="http://schemas.openxmlformats.org/officeDocument/2006/relationships" xmlns:p="http://schemas.openxmlformats.org/presentationml/2006/main">
-  <p:cSld>
-    <p:spTree>
-      <p:nvGrpSpPr>
-        <p:cNvPr id="1" name=""/>
-        <p:cNvGrpSpPr/>
-        <p:nvPr/>
-      </p:nvGrpSpPr>
-      <p:grpSpPr>
-        <a:xfrm>
-          <a:off x="0" y="0"/>
-          <a:ext cx="0" cy="0"/>
-          <a:chOff x="0" y="0"/>
-          <a:chExt cx="0" cy="0"/>
-        </a:xfrm>
-      </p:grpSpPr>
-      <p:sp>
-        <p:nvSpPr>
-          <p:cNvPr id="2" name="Title 1"/>
-          <p:cNvSpPr>
-            <a:spLocks noGrp="1"/>
-          </p:cNvSpPr>
-          <p:nvPr>
-            <p:ph type="title"/>
-          </p:nvPr>
-        </p:nvSpPr>
-        <p:spPr/>
-        <p:txBody>
-          <a:bodyPr/>
-          <a:lstStyle/>
-          <a:p>
-            <a:r>
-              <a:rPr lang="en-US" dirty="0"/>
-              <a:t>SDL2</a:t>
-            </a:r>
-          </a:p>
-        </p:txBody>
-      </p:sp>
-      <p:sp>
-        <p:nvSpPr>
-          <p:cNvPr id="3" name="Content Placeholder 2"/>
-          <p:cNvSpPr>
-            <a:spLocks noGrp="1"/>
-          </p:cNvSpPr>
-          <p:nvPr>
-            <p:ph idx="1"/>
-          </p:nvPr>
-        </p:nvSpPr>
-        <p:spPr/>
-        <p:txBody>
-          <a:bodyPr/>
-          <a:lstStyle/>
-          <a:p>
-            <a:r>
-              <a:rPr lang="en-US" dirty="0"/>
-              <a:t>SDL is a simple media library that allows drawing images to screen, and other simple graphics based tasks.</a:t>
-            </a:r>
-          </a:p>
-          <a:p>
-            <a:endParaRPr lang="en-US" dirty="0"/>
-          </a:p>
-          <a:p>
-            <a:r>
-              <a:rPr lang="en-US" dirty="0"/>
-              <a:t>These slides serve as a quick introduction to the library</a:t>
-            </a:r>
-          </a:p>
-          <a:p>
-            <a:pPr lvl="1"/>
-            <a:r>
-              <a:rPr lang="en-US" dirty="0"/>
-              <a:t>i.e., the SDL code that is provided in the starter pack for the class.</a:t>
-            </a:r>
-          </a:p>
-        </p:txBody>
-      </p:sp>
-      <p:sp>
-        <p:nvSpPr>
-          <p:cNvPr id="4" name="Footer Placeholder 3"/>
-          <p:cNvSpPr>
-            <a:spLocks noGrp="1"/>
-          </p:cNvSpPr>
-          <p:nvPr>
-            <p:ph type="ftr" sz="quarter" idx="10"/>
-          </p:nvPr>
-        </p:nvSpPr>
-        <p:spPr/>
-        <p:txBody>
-          <a:bodyPr/>
-          <a:lstStyle/>
-          <a:p>
-            <a:fld id="{D0357299-C40C-42AB-B0C0-2E6E0A5A7F61}" type="slidenum">
-              <a:rPr lang="en-US" altLang="zh-CN" smtClean="0"/>
-              <a:pPr/>
-              <a:t>15</a:t>
-            </a:fld>
-            <a:endParaRPr lang="en-US" altLang="zh-CN"/>
-          </a:p>
-        </p:txBody>
-      </p:sp>
-    </p:spTree>
-    <p:extLst>
-      <p:ext uri="{BB962C8B-B14F-4D97-AF65-F5344CB8AC3E}">
-        <p14:creationId xmlns:p14="http://schemas.microsoft.com/office/powerpoint/2010/main" val="1824298685"/>
-      </p:ext>
-    </p:extLst>
-  </p:cSld>
-  <p:clrMapOvr>
-    <a:masterClrMapping/>
-  </p:clrMapOvr>
-</p:sld>
-</file>
-
-<file path=ppt/slides/slide16.xml><?xml version="1.0" encoding="utf-8"?>
-<p:sld xmlns:a="http://schemas.openxmlformats.org/drawingml/2006/main" xmlns:r="http://schemas.openxmlformats.org/officeDocument/2006/relationships" xmlns:p="http://schemas.openxmlformats.org/presentationml/2006/main">
+<file path=ppt/slides/slide30.xml><?xml version="1.0" encoding="utf-8"?>
+<p:sld xmlns:a="http://schemas.openxmlformats.org/drawingml/2006/main" xmlns:r="http://schemas.openxmlformats.org/officeDocument/2006/relationships" xmlns:p="http://schemas.openxmlformats.org/presentationml/2006/main" show="0">
   <p:cSld>
     <p:spTree>
       <p:nvGrpSpPr>
@@ -5134,7 +7619,7 @@
             <a:fld id="{D0357299-C40C-42AB-B0C0-2E6E0A5A7F61}" type="slidenum">
               <a:rPr lang="en-US" altLang="zh-CN" smtClean="0"/>
               <a:pPr/>
-              <a:t>16</a:t>
+              <a:t>30</a:t>
             </a:fld>
             <a:endParaRPr lang="en-US" altLang="zh-CN"/>
           </a:p>
@@ -5153,8 +7638,8 @@
 </p:sld>
 </file>
 
-<file path=ppt/slides/slide17.xml><?xml version="1.0" encoding="utf-8"?>
-<p:sld xmlns:a="http://schemas.openxmlformats.org/drawingml/2006/main" xmlns:r="http://schemas.openxmlformats.org/officeDocument/2006/relationships" xmlns:p="http://schemas.openxmlformats.org/presentationml/2006/main">
+<file path=ppt/slides/slide31.xml><?xml version="1.0" encoding="utf-8"?>
+<p:sld xmlns:a="http://schemas.openxmlformats.org/drawingml/2006/main" xmlns:r="http://schemas.openxmlformats.org/officeDocument/2006/relationships" xmlns:p="http://schemas.openxmlformats.org/presentationml/2006/main" show="0">
   <p:cSld>
     <p:spTree>
       <p:nvGrpSpPr>
@@ -5405,7 +7890,7 @@
             <a:fld id="{D0357299-C40C-42AB-B0C0-2E6E0A5A7F61}" type="slidenum">
               <a:rPr lang="en-US" altLang="zh-CN" smtClean="0"/>
               <a:pPr/>
-              <a:t>17</a:t>
+              <a:t>31</a:t>
             </a:fld>
             <a:endParaRPr lang="en-US" altLang="zh-CN"/>
           </a:p>
@@ -5453,8 +7938,8 @@
 </p:sld>
 </file>
 
-<file path=ppt/slides/slide18.xml><?xml version="1.0" encoding="utf-8"?>
-<p:sld xmlns:a="http://schemas.openxmlformats.org/drawingml/2006/main" xmlns:r="http://schemas.openxmlformats.org/officeDocument/2006/relationships" xmlns:p="http://schemas.openxmlformats.org/presentationml/2006/main">
+<file path=ppt/slides/slide32.xml><?xml version="1.0" encoding="utf-8"?>
+<p:sld xmlns:a="http://schemas.openxmlformats.org/drawingml/2006/main" xmlns:r="http://schemas.openxmlformats.org/officeDocument/2006/relationships" xmlns:p="http://schemas.openxmlformats.org/presentationml/2006/main" show="0">
   <p:cSld>
     <p:spTree>
       <p:nvGrpSpPr>
@@ -5711,7 +8196,7 @@
             <a:fld id="{D0357299-C40C-42AB-B0C0-2E6E0A5A7F61}" type="slidenum">
               <a:rPr lang="en-US" altLang="zh-CN" smtClean="0"/>
               <a:pPr/>
-              <a:t>18</a:t>
+              <a:t>32</a:t>
             </a:fld>
             <a:endParaRPr lang="en-US" altLang="zh-CN"/>
           </a:p>
@@ -5759,8 +8244,8 @@
 </p:sld>
 </file>
 
-<file path=ppt/slides/slide19.xml><?xml version="1.0" encoding="utf-8"?>
-<p:sld xmlns:a="http://schemas.openxmlformats.org/drawingml/2006/main" xmlns:r="http://schemas.openxmlformats.org/officeDocument/2006/relationships" xmlns:p="http://schemas.openxmlformats.org/presentationml/2006/main">
+<file path=ppt/slides/slide33.xml><?xml version="1.0" encoding="utf-8"?>
+<p:sld xmlns:a="http://schemas.openxmlformats.org/drawingml/2006/main" xmlns:r="http://schemas.openxmlformats.org/officeDocument/2006/relationships" xmlns:p="http://schemas.openxmlformats.org/presentationml/2006/main" show="0">
   <p:cSld>
     <p:spTree>
       <p:nvGrpSpPr>
@@ -6024,7 +8509,7 @@
             <a:fld id="{D0357299-C40C-42AB-B0C0-2E6E0A5A7F61}" type="slidenum">
               <a:rPr lang="en-US" altLang="zh-CN" smtClean="0"/>
               <a:pPr/>
-              <a:t>19</a:t>
+              <a:t>33</a:t>
             </a:fld>
             <a:endParaRPr lang="en-US" altLang="zh-CN"/>
           </a:p>
@@ -6063,250 +8548,6 @@
     <p:extLst>
       <p:ext uri="{BB962C8B-B14F-4D97-AF65-F5344CB8AC3E}">
         <p14:creationId xmlns:p14="http://schemas.microsoft.com/office/powerpoint/2010/main" val="2430141299"/>
-      </p:ext>
-    </p:extLst>
-  </p:cSld>
-  <p:clrMapOvr>
-    <a:masterClrMapping/>
-  </p:clrMapOvr>
-</p:sld>
-</file>
-
-<file path=ppt/slides/slide2.xml><?xml version="1.0" encoding="utf-8"?>
-<p:sld xmlns:a="http://schemas.openxmlformats.org/drawingml/2006/main" xmlns:r="http://schemas.openxmlformats.org/officeDocument/2006/relationships" xmlns:p="http://schemas.openxmlformats.org/presentationml/2006/main">
-  <p:cSld>
-    <p:spTree>
-      <p:nvGrpSpPr>
-        <p:cNvPr id="1" name=""/>
-        <p:cNvGrpSpPr/>
-        <p:nvPr/>
-      </p:nvGrpSpPr>
-      <p:grpSpPr>
-        <a:xfrm>
-          <a:off x="0" y="0"/>
-          <a:ext cx="0" cy="0"/>
-          <a:chOff x="0" y="0"/>
-          <a:chExt cx="0" cy="0"/>
-        </a:xfrm>
-      </p:grpSpPr>
-      <p:sp>
-        <p:nvSpPr>
-          <p:cNvPr id="2" name="Title 1"/>
-          <p:cNvSpPr>
-            <a:spLocks noGrp="1"/>
-          </p:cNvSpPr>
-          <p:nvPr>
-            <p:ph type="title"/>
-          </p:nvPr>
-        </p:nvSpPr>
-        <p:spPr/>
-        <p:txBody>
-          <a:bodyPr/>
-          <a:lstStyle/>
-          <a:p>
-            <a:r>
-              <a:rPr lang="en-US" dirty="0"/>
-              <a:t>Event-Driven Programming</a:t>
-            </a:r>
-          </a:p>
-        </p:txBody>
-      </p:sp>
-      <p:sp>
-        <p:nvSpPr>
-          <p:cNvPr id="3" name="Content Placeholder 2"/>
-          <p:cNvSpPr>
-            <a:spLocks noGrp="1"/>
-          </p:cNvSpPr>
-          <p:nvPr>
-            <p:ph idx="1"/>
-          </p:nvPr>
-        </p:nvSpPr>
-        <p:spPr/>
-        <p:txBody>
-          <a:bodyPr/>
-          <a:lstStyle/>
-          <a:p>
-            <a:r>
-              <a:rPr lang="en-US" dirty="0"/>
-              <a:t>Consider all the programs you’ve written up to this point</a:t>
-            </a:r>
-          </a:p>
-          <a:p>
-            <a:r>
-              <a:rPr lang="en-US" dirty="0"/>
-              <a:t>Did they do anything when the user didn’t ask for something?</a:t>
-            </a:r>
-          </a:p>
-          <a:p>
-            <a:r>
-              <a:rPr lang="en-US" dirty="0"/>
-              <a:t>Was there processing in the background?</a:t>
-            </a:r>
-          </a:p>
-          <a:p>
-            <a:r>
-              <a:rPr lang="en-US" dirty="0"/>
-              <a:t>Or did it mainly respond to user input?</a:t>
-            </a:r>
-          </a:p>
-        </p:txBody>
-      </p:sp>
-      <p:sp>
-        <p:nvSpPr>
-          <p:cNvPr id="4" name="Footer Placeholder 3"/>
-          <p:cNvSpPr>
-            <a:spLocks noGrp="1"/>
-          </p:cNvSpPr>
-          <p:nvPr>
-            <p:ph type="ftr" sz="quarter" idx="10"/>
-          </p:nvPr>
-        </p:nvSpPr>
-        <p:spPr/>
-        <p:txBody>
-          <a:bodyPr/>
-          <a:lstStyle/>
-          <a:p>
-            <a:fld id="{D0357299-C40C-42AB-B0C0-2E6E0A5A7F61}" type="slidenum">
-              <a:rPr lang="en-US" altLang="zh-CN" smtClean="0"/>
-              <a:pPr/>
-              <a:t>2</a:t>
-            </a:fld>
-            <a:endParaRPr lang="en-US" altLang="zh-CN"/>
-          </a:p>
-        </p:txBody>
-      </p:sp>
-    </p:spTree>
-    <p:extLst>
-      <p:ext uri="{BB962C8B-B14F-4D97-AF65-F5344CB8AC3E}">
-        <p14:creationId xmlns:p14="http://schemas.microsoft.com/office/powerpoint/2010/main" val="2514981305"/>
-      </p:ext>
-    </p:extLst>
-  </p:cSld>
-  <p:clrMapOvr>
-    <a:masterClrMapping/>
-  </p:clrMapOvr>
-</p:sld>
-</file>
-
-<file path=ppt/slides/slide3.xml><?xml version="1.0" encoding="utf-8"?>
-<p:sld xmlns:a="http://schemas.openxmlformats.org/drawingml/2006/main" xmlns:r="http://schemas.openxmlformats.org/officeDocument/2006/relationships" xmlns:p="http://schemas.openxmlformats.org/presentationml/2006/main">
-  <p:cSld>
-    <p:spTree>
-      <p:nvGrpSpPr>
-        <p:cNvPr id="1" name=""/>
-        <p:cNvGrpSpPr/>
-        <p:nvPr/>
-      </p:nvGrpSpPr>
-      <p:grpSpPr>
-        <a:xfrm>
-          <a:off x="0" y="0"/>
-          <a:ext cx="0" cy="0"/>
-          <a:chOff x="0" y="0"/>
-          <a:chExt cx="0" cy="0"/>
-        </a:xfrm>
-      </p:grpSpPr>
-      <p:sp>
-        <p:nvSpPr>
-          <p:cNvPr id="2" name="Title 1"/>
-          <p:cNvSpPr>
-            <a:spLocks noGrp="1"/>
-          </p:cNvSpPr>
-          <p:nvPr>
-            <p:ph type="title"/>
-          </p:nvPr>
-        </p:nvSpPr>
-        <p:spPr/>
-        <p:txBody>
-          <a:bodyPr/>
-          <a:lstStyle/>
-          <a:p>
-            <a:r>
-              <a:rPr lang="en-US" dirty="0"/>
-              <a:t>Event-Driven Programming</a:t>
-            </a:r>
-          </a:p>
-        </p:txBody>
-      </p:sp>
-      <p:sp>
-        <p:nvSpPr>
-          <p:cNvPr id="3" name="Content Placeholder 2"/>
-          <p:cNvSpPr>
-            <a:spLocks noGrp="1"/>
-          </p:cNvSpPr>
-          <p:nvPr>
-            <p:ph idx="1"/>
-          </p:nvPr>
-        </p:nvSpPr>
-        <p:spPr/>
-        <p:txBody>
-          <a:bodyPr/>
-          <a:lstStyle/>
-          <a:p>
-            <a:r>
-              <a:rPr lang="en-US" dirty="0"/>
-              <a:t>The event-driven paradigm works great for a lot of systems</a:t>
-            </a:r>
-          </a:p>
-          <a:p>
-            <a:pPr lvl="1"/>
-            <a:r>
-              <a:rPr lang="en-US" dirty="0"/>
-              <a:t>Web (we REALLY want this!)</a:t>
-            </a:r>
-          </a:p>
-          <a:p>
-            <a:pPr lvl="1"/>
-            <a:r>
-              <a:rPr lang="en-US" dirty="0"/>
-              <a:t>Mobile</a:t>
-            </a:r>
-          </a:p>
-          <a:p>
-            <a:pPr lvl="1"/>
-            <a:r>
-              <a:rPr lang="en-US" dirty="0"/>
-              <a:t>Office apps</a:t>
-            </a:r>
-          </a:p>
-          <a:p>
-            <a:endParaRPr lang="en-US" dirty="0"/>
-          </a:p>
-          <a:p>
-            <a:r>
-              <a:rPr lang="en-US" dirty="0"/>
-              <a:t>Well, yea…games use A LOT of event programming, but we’ll get there soon enough.</a:t>
-            </a:r>
-          </a:p>
-        </p:txBody>
-      </p:sp>
-      <p:sp>
-        <p:nvSpPr>
-          <p:cNvPr id="4" name="Footer Placeholder 3"/>
-          <p:cNvSpPr>
-            <a:spLocks noGrp="1"/>
-          </p:cNvSpPr>
-          <p:nvPr>
-            <p:ph type="ftr" sz="quarter" idx="10"/>
-          </p:nvPr>
-        </p:nvSpPr>
-        <p:spPr/>
-        <p:txBody>
-          <a:bodyPr/>
-          <a:lstStyle/>
-          <a:p>
-            <a:fld id="{D0357299-C40C-42AB-B0C0-2E6E0A5A7F61}" type="slidenum">
-              <a:rPr lang="en-US" altLang="zh-CN" smtClean="0"/>
-              <a:pPr/>
-              <a:t>3</a:t>
-            </a:fld>
-            <a:endParaRPr lang="en-US" altLang="zh-CN"/>
-          </a:p>
-        </p:txBody>
-      </p:sp>
-    </p:spTree>
-    <p:extLst>
-      <p:ext uri="{BB962C8B-B14F-4D97-AF65-F5344CB8AC3E}">
-        <p14:creationId xmlns:p14="http://schemas.microsoft.com/office/powerpoint/2010/main" val="134252993"/>
       </p:ext>
     </p:extLst>
   </p:cSld>
@@ -7673,7 +9914,7 @@
           <a:p>
             <a:r>
               <a:rPr lang="en-US" dirty="0"/>
-              <a:t>Step 2. Process actions</a:t>
+              <a:t>Step 1. Player Input</a:t>
             </a:r>
           </a:p>
         </p:txBody>
@@ -7695,25 +9936,58 @@
           <a:p>
             <a:r>
               <a:rPr lang="en-US" dirty="0"/>
-              <a:t>Alter the game state based on your input</a:t>
-            </a:r>
-          </a:p>
-          <a:p>
+              <a:t>Button presses usually have three events:</a:t>
+            </a:r>
+          </a:p>
+          <a:p>
+            <a:pPr lvl="1"/>
+            <a:r>
+              <a:rPr lang="en-US" dirty="0" err="1"/>
+              <a:t>ButtonDown</a:t>
+            </a:r>
             <a:endParaRPr lang="en-US" dirty="0"/>
           </a:p>
           <a:p>
+            <a:pPr lvl="2"/>
             <a:r>
               <a:rPr lang="en-US" dirty="0"/>
-              <a:t>However, don’t lock the controller to directly changing the state!</a:t>
-            </a:r>
-          </a:p>
-          <a:p>
+              <a:t>If button not down last frame AND down this frame</a:t>
+            </a:r>
+          </a:p>
+          <a:p>
+            <a:pPr lvl="1"/>
+            <a:r>
+              <a:rPr lang="en-US" dirty="0" err="1"/>
+              <a:t>ButtonHeld</a:t>
+            </a:r>
             <a:endParaRPr lang="en-US" dirty="0"/>
           </a:p>
           <a:p>
+            <a:pPr lvl="2"/>
             <a:r>
               <a:rPr lang="en-US" dirty="0"/>
-              <a:t>Place a buffer here – have it call a method which allows some flexibility in design later</a:t>
+              <a:t>If button down this frame</a:t>
+            </a:r>
+          </a:p>
+          <a:p>
+            <a:pPr lvl="1"/>
+            <a:r>
+              <a:rPr lang="en-US" dirty="0" err="1"/>
+              <a:t>ButtonUp</a:t>
+            </a:r>
+            <a:endParaRPr lang="en-US" dirty="0"/>
+          </a:p>
+          <a:p>
+            <a:pPr lvl="2"/>
+            <a:r>
+              <a:rPr lang="en-US" dirty="0"/>
+              <a:t>Button down last frame AND up this frame</a:t>
+            </a:r>
+          </a:p>
+          <a:p>
+            <a:r>
+              <a:rPr lang="en-US" b="1" dirty="0"/>
+              <a:t>What problems can this cause? How would we deal with each of those issues?</a:t>
             </a:r>
           </a:p>
         </p:txBody>
@@ -7745,7 +10019,7 @@
     </p:spTree>
     <p:extLst>
       <p:ext uri="{BB962C8B-B14F-4D97-AF65-F5344CB8AC3E}">
-        <p14:creationId xmlns:p14="http://schemas.microsoft.com/office/powerpoint/2010/main" val="176432872"/>
+        <p14:creationId xmlns:p14="http://schemas.microsoft.com/office/powerpoint/2010/main" val="2540175597"/>
       </p:ext>
     </p:extLst>
   </p:cSld>
@@ -7789,7 +10063,7 @@
           <a:p>
             <a:r>
               <a:rPr lang="en-US" dirty="0"/>
-              <a:t>Step 3. Process NPCs</a:t>
+              <a:t>Step 2. Process actions</a:t>
             </a:r>
           </a:p>
         </p:txBody>
@@ -7810,41 +10084,41 @@
           <a:lstStyle/>
           <a:p>
             <a:r>
-              <a:rPr lang="en-US" sz="2800" dirty="0"/>
-              <a:t>An NPC (Non-Player Character) is anything that has volition in the world that isn’t you</a:t>
-            </a:r>
-          </a:p>
-          <a:p>
-            <a:r>
-              <a:rPr lang="en-US" sz="2800" dirty="0"/>
-              <a:t>NPCs take input from the AI engine (maybe!) but not from a direct controller</a:t>
-            </a:r>
-          </a:p>
-          <a:p>
-            <a:r>
-              <a:rPr lang="en-US" sz="2800" dirty="0"/>
-              <a:t>Work on the idea of Sense-Think-Act:</a:t>
+              <a:rPr lang="en-US" dirty="0"/>
+              <a:t>Alter the game state based on your input</a:t>
+            </a:r>
+          </a:p>
+          <a:p>
+            <a:endParaRPr lang="en-US" dirty="0"/>
+          </a:p>
+          <a:p>
+            <a:r>
+              <a:rPr lang="en-US" dirty="0"/>
+              <a:t>However, don’t lock the controller to directly changing the state!</a:t>
+            </a:r>
+          </a:p>
+          <a:p>
+            <a:r>
+              <a:rPr lang="en-US" dirty="0"/>
+              <a:t>Place a buffer here – have it call a method which allows some flexibility in design later</a:t>
             </a:r>
           </a:p>
           <a:p>
             <a:pPr lvl="1"/>
             <a:r>
+              <a:rPr lang="en-US" dirty="0" err="1"/>
+              <a:t>Eg.</a:t>
+            </a:r>
+            <a:r>
               <a:rPr lang="en-US" dirty="0"/>
-              <a:t>Sense the state of the world around it (how can we “cheat” here to make an NPC “harder”?)</a:t>
+              <a:t>, button press calls run()</a:t>
             </a:r>
           </a:p>
           <a:p>
             <a:pPr lvl="1"/>
             <a:r>
               <a:rPr lang="en-US" dirty="0"/>
-              <a:t>Think about what action to perform (usually limited choices)</a:t>
-            </a:r>
-          </a:p>
-          <a:p>
-            <a:pPr lvl="1"/>
-            <a:r>
-              <a:rPr lang="en-US" dirty="0"/>
-              <a:t>Act in the world</a:t>
+              <a:t>Run() moves character </a:t>
             </a:r>
           </a:p>
         </p:txBody>
@@ -7876,7 +10150,7 @@
     </p:spTree>
     <p:extLst>
       <p:ext uri="{BB962C8B-B14F-4D97-AF65-F5344CB8AC3E}">
-        <p14:creationId xmlns:p14="http://schemas.microsoft.com/office/powerpoint/2010/main" val="4013398994"/>
+        <p14:creationId xmlns:p14="http://schemas.microsoft.com/office/powerpoint/2010/main" val="176432872"/>
       </p:ext>
     </p:extLst>
   </p:cSld>

</xml_diff>